<commit_message>
Additional slide / demo notes
</commit_message>
<xml_diff>
--- a/000.pptx
+++ b/000.pptx
@@ -240,7 +240,7 @@
               <a:pPr>
                 <a:defRPr/>
               </a:pPr>
-              <a:t>7/21/11</a:t>
+              <a:t>7/26/11</a:t>
             </a:fld>
             <a:endParaRPr lang="en-US"/>
           </a:p>
@@ -423,7 +423,7 @@
               <a:pPr>
                 <a:defRPr/>
               </a:pPr>
-              <a:t>7/21/11</a:t>
+              <a:t>7/26/11</a:t>
             </a:fld>
             <a:endParaRPr lang="en-US"/>
           </a:p>
@@ -1133,11 +1133,11 @@
           <a:p>
             <a:r>
               <a:rPr lang="en-US" dirty="0" smtClean="0"/>
-              <a:t>“Advanced” is a loaded term –</a:t>
+              <a:t>Give the daily</a:t>
             </a:r>
             <a:r>
               <a:rPr lang="en-US" baseline="0" dirty="0" smtClean="0"/>
-              <a:t> what’s advanced to you might not be what’s advanced to me, so we do the best we can to define what we mean by advanced</a:t>
+              <a:t> schedule: start/stop times, etc.</a:t>
             </a:r>
           </a:p>
           <a:p>
@@ -1146,16 +1146,21 @@
           <a:p>
             <a:r>
               <a:rPr lang="en-US" baseline="0" dirty="0" smtClean="0"/>
-              <a:t>As a practical matter, our advanced training is the basis for TCMD</a:t>
-            </a:r>
-          </a:p>
-          <a:p>
+              <a:t>Review facilities – restrooms, break and </a:t>
+            </a:r>
+            <a:r>
+              <a:rPr lang="en-US" baseline="0" smtClean="0"/>
+              <a:t>lunch rooms, etc.</a:t>
+            </a:r>
             <a:endParaRPr lang="en-US" baseline="0" dirty="0" smtClean="0"/>
           </a:p>
           <a:p>
+            <a:endParaRPr lang="en-US" baseline="0" dirty="0" smtClean="0"/>
+          </a:p>
+          <a:p>
             <a:r>
               <a:rPr lang="en-US" baseline="0" dirty="0" smtClean="0"/>
-              <a:t>“Best of breed” means delivering the best of the target platform – deep OS integration, solid performance, and polished user interface</a:t>
+              <a:t>Phones on vibrate, respect the silence and work needs of the others around you</a:t>
             </a:r>
             <a:endParaRPr lang="en-US" dirty="0"/>
           </a:p>
@@ -1184,7 +1189,7 @@
               <a:pPr>
                 <a:defRPr/>
               </a:pPr>
-              <a:t>3</a:t>
+              <a:t>2</a:t>
             </a:fld>
             <a:endParaRPr lang="en-US"/>
           </a:p>
@@ -1193,7 +1198,7 @@
     </p:spTree>
     <p:extLst>
       <p:ext uri="{BB962C8B-B14F-4D97-AF65-F5344CB8AC3E}">
-        <p14:creationId xmlns:p14="http://schemas.microsoft.com/office/powerpoint/2010/main" val="558850620"/>
+        <p14:creationId xmlns:p14="http://schemas.microsoft.com/office/powerpoint/2010/main" val="439064934"/>
       </p:ext>
     </p:extLst>
   </p:cSld>
@@ -1249,6 +1254,122 @@
           <a:p>
             <a:r>
               <a:rPr lang="en-US" dirty="0" smtClean="0"/>
+              <a:t>“Advanced” is a loaded term –</a:t>
+            </a:r>
+            <a:r>
+              <a:rPr lang="en-US" baseline="0" dirty="0" smtClean="0"/>
+              <a:t> what’s advanced to you might not be what’s advanced to me, so we do the best we can to define what we mean by advanced</a:t>
+            </a:r>
+          </a:p>
+          <a:p>
+            <a:endParaRPr lang="en-US" baseline="0" dirty="0" smtClean="0"/>
+          </a:p>
+          <a:p>
+            <a:r>
+              <a:rPr lang="en-US" baseline="0" dirty="0" smtClean="0"/>
+              <a:t>As a practical matter, our advanced training is the basis for TCMD</a:t>
+            </a:r>
+          </a:p>
+          <a:p>
+            <a:endParaRPr lang="en-US" baseline="0" dirty="0" smtClean="0"/>
+          </a:p>
+          <a:p>
+            <a:r>
+              <a:rPr lang="en-US" baseline="0" dirty="0" smtClean="0"/>
+              <a:t>“Best of breed” means delivering the best of the target platform – deep OS integration, solid performance, and polished user interface</a:t>
+            </a:r>
+            <a:endParaRPr lang="en-US" dirty="0"/>
+          </a:p>
+        </p:txBody>
+      </p:sp>
+      <p:sp>
+        <p:nvSpPr>
+          <p:cNvPr id="4" name="Slide Number Placeholder 3"/>
+          <p:cNvSpPr>
+            <a:spLocks noGrp="1"/>
+          </p:cNvSpPr>
+          <p:nvPr>
+            <p:ph type="sldNum" sz="quarter" idx="10"/>
+          </p:nvPr>
+        </p:nvSpPr>
+        <p:spPr/>
+        <p:txBody>
+          <a:bodyPr/>
+          <a:lstStyle/>
+          <a:p>
+            <a:pPr>
+              <a:defRPr/>
+            </a:pPr>
+            <a:fld id="{0B02E734-84D0-8641-B8E0-8B1913E3457A}" type="slidenum">
+              <a:rPr lang="en-US" smtClean="0"/>
+              <a:pPr>
+                <a:defRPr/>
+              </a:pPr>
+              <a:t>3</a:t>
+            </a:fld>
+            <a:endParaRPr lang="en-US"/>
+          </a:p>
+        </p:txBody>
+      </p:sp>
+    </p:spTree>
+    <p:extLst>
+      <p:ext uri="{BB962C8B-B14F-4D97-AF65-F5344CB8AC3E}">
+        <p14:creationId xmlns:p14="http://schemas.microsoft.com/office/powerpoint/2010/main" val="558850620"/>
+      </p:ext>
+    </p:extLst>
+  </p:cSld>
+  <p:clrMapOvr>
+    <a:masterClrMapping/>
+  </p:clrMapOvr>
+</p:notes>
+</file>
+
+<file path=ppt/notesSlides/notesSlide4.xml><?xml version="1.0" encoding="utf-8"?>
+<p:notes xmlns:a="http://schemas.openxmlformats.org/drawingml/2006/main" xmlns:r="http://schemas.openxmlformats.org/officeDocument/2006/relationships" xmlns:p="http://schemas.openxmlformats.org/presentationml/2006/main">
+  <p:cSld>
+    <p:spTree>
+      <p:nvGrpSpPr>
+        <p:cNvPr id="1" name=""/>
+        <p:cNvGrpSpPr/>
+        <p:nvPr/>
+      </p:nvGrpSpPr>
+      <p:grpSpPr>
+        <a:xfrm>
+          <a:off x="0" y="0"/>
+          <a:ext cx="0" cy="0"/>
+          <a:chOff x="0" y="0"/>
+          <a:chExt cx="0" cy="0"/>
+        </a:xfrm>
+      </p:grpSpPr>
+      <p:sp>
+        <p:nvSpPr>
+          <p:cNvPr id="2" name="Slide Image Placeholder 1"/>
+          <p:cNvSpPr>
+            <a:spLocks noGrp="1" noRot="1" noChangeAspect="1"/>
+          </p:cNvSpPr>
+          <p:nvPr>
+            <p:ph type="sldImg"/>
+          </p:nvPr>
+        </p:nvSpPr>
+        <p:spPr/>
+      </p:sp>
+      <p:sp>
+        <p:nvSpPr>
+          <p:cNvPr id="3" name="Notes Placeholder 2"/>
+          <p:cNvSpPr>
+            <a:spLocks noGrp="1"/>
+          </p:cNvSpPr>
+          <p:nvPr>
+            <p:ph type="body" idx="1"/>
+          </p:nvPr>
+        </p:nvSpPr>
+        <p:spPr/>
+        <p:txBody>
+          <a:bodyPr/>
+          <a:lstStyle/>
+          <a:p>
+            <a:r>
+              <a:rPr lang="en-US" dirty="0" smtClean="0"/>
               <a:t>We’ll start by sharing techniques we’ve learned for creating </a:t>
             </a:r>
             <a:r>
@@ -1422,7 +1543,7 @@
 </p:notes>
 </file>
 
-<file path=ppt/notesSlides/notesSlide4.xml><?xml version="1.0" encoding="utf-8"?>
+<file path=ppt/notesSlides/notesSlide5.xml><?xml version="1.0" encoding="utf-8"?>
 <p:notes xmlns:a="http://schemas.openxmlformats.org/drawingml/2006/main" xmlns:r="http://schemas.openxmlformats.org/officeDocument/2006/relationships" xmlns:p="http://schemas.openxmlformats.org/presentationml/2006/main">
   <p:cSld>
     <p:spTree>
@@ -1862,7 +1983,7 @@
               <a:pPr>
                 <a:defRPr/>
               </a:pPr>
-              <a:t>7/21/11</a:t>
+              <a:t>7/26/11</a:t>
             </a:fld>
             <a:endParaRPr lang="en-US"/>
           </a:p>
@@ -2152,7 +2273,7 @@
               <a:pPr>
                 <a:defRPr/>
               </a:pPr>
-              <a:t>7/21/11</a:t>
+              <a:t>7/26/11</a:t>
             </a:fld>
             <a:endParaRPr lang="en-US"/>
           </a:p>
@@ -2349,7 +2470,7 @@
               <a:pPr>
                 <a:defRPr/>
               </a:pPr>
-              <a:t>7/21/11</a:t>
+              <a:t>7/26/11</a:t>
             </a:fld>
             <a:endParaRPr lang="en-US"/>
           </a:p>
@@ -2556,7 +2677,7 @@
               <a:pPr>
                 <a:defRPr/>
               </a:pPr>
-              <a:t>7/21/11</a:t>
+              <a:t>7/26/11</a:t>
             </a:fld>
             <a:endParaRPr lang="en-US"/>
           </a:p>
@@ -2825,7 +2946,7 @@
               <a:pPr>
                 <a:defRPr/>
               </a:pPr>
-              <a:t>7/21/11</a:t>
+              <a:t>7/26/11</a:t>
             </a:fld>
             <a:endParaRPr lang="en-US"/>
           </a:p>
@@ -3022,7 +3143,7 @@
               <a:pPr>
                 <a:defRPr/>
               </a:pPr>
-              <a:t>7/21/11</a:t>
+              <a:t>7/26/11</a:t>
             </a:fld>
             <a:endParaRPr lang="en-US"/>
           </a:p>
@@ -3295,7 +3416,7 @@
               <a:pPr>
                 <a:defRPr/>
               </a:pPr>
-              <a:t>7/21/11</a:t>
+              <a:t>7/26/11</a:t>
             </a:fld>
             <a:endParaRPr lang="en-US"/>
           </a:p>
@@ -3610,7 +3731,7 @@
               <a:pPr>
                 <a:defRPr/>
               </a:pPr>
-              <a:t>7/21/11</a:t>
+              <a:t>7/26/11</a:t>
             </a:fld>
             <a:endParaRPr lang="en-US"/>
           </a:p>
@@ -4059,7 +4180,7 @@
               <a:pPr>
                 <a:defRPr/>
               </a:pPr>
-              <a:t>7/21/11</a:t>
+              <a:t>7/26/11</a:t>
             </a:fld>
             <a:endParaRPr lang="en-US"/>
           </a:p>
@@ -4204,7 +4325,7 @@
               <a:pPr>
                 <a:defRPr/>
               </a:pPr>
-              <a:t>7/21/11</a:t>
+              <a:t>7/26/11</a:t>
             </a:fld>
             <a:endParaRPr lang="en-US"/>
           </a:p>
@@ -4326,7 +4447,7 @@
               <a:pPr>
                 <a:defRPr/>
               </a:pPr>
-              <a:t>7/21/11</a:t>
+              <a:t>7/26/11</a:t>
             </a:fld>
             <a:endParaRPr lang="en-US"/>
           </a:p>
@@ -4544,7 +4665,7 @@
               <a:pPr>
                 <a:defRPr/>
               </a:pPr>
-              <a:t>7/21/11</a:t>
+              <a:t>7/26/11</a:t>
             </a:fld>
             <a:endParaRPr lang="en-US"/>
           </a:p>
@@ -4848,7 +4969,7 @@
               <a:pPr>
                 <a:defRPr/>
               </a:pPr>
-              <a:t>7/21/11</a:t>
+              <a:t>7/26/11</a:t>
             </a:fld>
             <a:endParaRPr lang="en-US"/>
           </a:p>
@@ -5131,7 +5252,7 @@
               <a:pPr>
                 <a:defRPr/>
               </a:pPr>
-              <a:t>7/21/11</a:t>
+              <a:t>7/26/11</a:t>
             </a:fld>
             <a:endParaRPr lang="en-US"/>
           </a:p>
@@ -5328,7 +5449,7 @@
               <a:pPr>
                 <a:defRPr/>
               </a:pPr>
-              <a:t>7/21/11</a:t>
+              <a:t>7/26/11</a:t>
             </a:fld>
             <a:endParaRPr lang="en-US"/>
           </a:p>
@@ -5535,7 +5656,7 @@
               <a:pPr>
                 <a:defRPr/>
               </a:pPr>
-              <a:t>7/21/11</a:t>
+              <a:t>7/26/11</a:t>
             </a:fld>
             <a:endParaRPr lang="en-US"/>
           </a:p>
@@ -6043,7 +6164,7 @@
               <a:pPr>
                 <a:defRPr/>
               </a:pPr>
-              <a:t>7/21/11</a:t>
+              <a:t>7/26/11</a:t>
             </a:fld>
             <a:endParaRPr lang="en-US"/>
           </a:p>
@@ -6349,7 +6470,7 @@
               <a:pPr>
                 <a:defRPr/>
               </a:pPr>
-              <a:t>7/21/11</a:t>
+              <a:t>7/26/11</a:t>
             </a:fld>
             <a:endParaRPr lang="en-US"/>
           </a:p>
@@ -6673,7 +6794,7 @@
               <a:pPr>
                 <a:defRPr/>
               </a:pPr>
-              <a:t>7/21/11</a:t>
+              <a:t>7/26/11</a:t>
             </a:fld>
             <a:endParaRPr lang="en-US"/>
           </a:p>
@@ -7122,7 +7243,7 @@
               <a:pPr>
                 <a:defRPr/>
               </a:pPr>
-              <a:t>7/21/11</a:t>
+              <a:t>7/26/11</a:t>
             </a:fld>
             <a:endParaRPr lang="en-US"/>
           </a:p>
@@ -7267,7 +7388,7 @@
               <a:pPr>
                 <a:defRPr/>
               </a:pPr>
-              <a:t>7/21/11</a:t>
+              <a:t>7/26/11</a:t>
             </a:fld>
             <a:endParaRPr lang="en-US"/>
           </a:p>
@@ -7389,7 +7510,7 @@
               <a:pPr>
                 <a:defRPr/>
               </a:pPr>
-              <a:t>7/21/11</a:t>
+              <a:t>7/26/11</a:t>
             </a:fld>
             <a:endParaRPr lang="en-US"/>
           </a:p>
@@ -7693,7 +7814,7 @@
               <a:pPr>
                 <a:defRPr/>
               </a:pPr>
-              <a:t>7/21/11</a:t>
+              <a:t>7/26/11</a:t>
             </a:fld>
             <a:endParaRPr lang="en-US"/>
           </a:p>
@@ -7979,7 +8100,7 @@
               <a:pPr>
                 <a:defRPr/>
               </a:pPr>
-              <a:t>7/21/11</a:t>
+              <a:t>7/26/11</a:t>
             </a:fld>
             <a:endParaRPr lang="en-US"/>
           </a:p>
@@ -8949,7 +9070,7 @@
               <a:pPr>
                 <a:defRPr/>
               </a:pPr>
-              <a:t>7/21/11</a:t>
+              <a:t>7/26/11</a:t>
             </a:fld>
             <a:endParaRPr lang="en-US"/>
           </a:p>
@@ -9924,7 +10045,7 @@
               <a:rPr lang="en-US" dirty="0" smtClean="0">
                 <a:latin typeface="Trebuchet MS" charset="0"/>
               </a:rPr>
-              <a:t>Logistics: Appcelerator World HQ</a:t>
+              <a:t>Logistics</a:t>
             </a:r>
             <a:endParaRPr lang="en-US" dirty="0">
               <a:latin typeface="Trebuchet MS" charset="0"/>
@@ -9972,7 +10093,7 @@
           </a:p>
           <a:p>
             <a:pPr marL="0" indent="0" eaLnBrk="1" hangingPunct="1"/>
-            <a:endParaRPr lang="en-US" dirty="0">
+            <a:endParaRPr lang="en-US" dirty="0" smtClean="0">
               <a:latin typeface="Trebuchet MS" charset="0"/>
             </a:endParaRPr>
           </a:p>
@@ -9982,37 +10103,7 @@
               <a:rPr lang="en-US" dirty="0" smtClean="0">
                 <a:latin typeface="Trebuchet MS" charset="0"/>
               </a:rPr>
-              <a:t>Welcome to our home!</a:t>
-            </a:r>
-          </a:p>
-          <a:p>
-            <a:pPr marL="0" indent="0" eaLnBrk="1" hangingPunct="1"/>
-            <a:endParaRPr lang="en-US" dirty="0">
-              <a:latin typeface="Trebuchet MS" charset="0"/>
-            </a:endParaRPr>
-          </a:p>
-          <a:p>
-            <a:pPr marL="0" indent="0" eaLnBrk="1" hangingPunct="1"/>
-            <a:r>
-              <a:rPr lang="en-US" dirty="0" smtClean="0">
-                <a:latin typeface="Trebuchet MS" charset="0"/>
-              </a:rPr>
-              <a:t>Keep it to a dull roar – coders at work</a:t>
-            </a:r>
-          </a:p>
-          <a:p>
-            <a:pPr marL="0" indent="0" eaLnBrk="1" hangingPunct="1"/>
-            <a:endParaRPr lang="en-US" dirty="0">
-              <a:latin typeface="Trebuchet MS" charset="0"/>
-            </a:endParaRPr>
-          </a:p>
-          <a:p>
-            <a:pPr marL="0" indent="0" eaLnBrk="1" hangingPunct="1"/>
-            <a:r>
-              <a:rPr lang="en-US" dirty="0" smtClean="0">
-                <a:latin typeface="Trebuchet MS" charset="0"/>
-              </a:rPr>
-              <a:t>We will likely say hi and introduce ourselves in common areas</a:t>
+              <a:t>Disturbances (phones, etc.)</a:t>
             </a:r>
             <a:endParaRPr lang="en-US" dirty="0">
               <a:latin typeface="Trebuchet MS" charset="0"/>

</xml_diff>

<commit_message>
Add page numbers, consistent slide titles, fixes
</commit_message>
<xml_diff>
--- a/000.pptx
+++ b/000.pptx
@@ -240,7 +240,7 @@
               <a:pPr>
                 <a:defRPr/>
               </a:pPr>
-              <a:t>7/26/11</a:t>
+              <a:t>8/19/11</a:t>
             </a:fld>
             <a:endParaRPr lang="en-US"/>
           </a:p>
@@ -423,7 +423,7 @@
               <a:pPr>
                 <a:defRPr/>
               </a:pPr>
-              <a:t>7/26/11</a:t>
+              <a:t>8/19/11</a:t>
             </a:fld>
             <a:endParaRPr lang="en-US"/>
           </a:p>
@@ -1688,60 +1688,6 @@
           <a:chExt cx="0" cy="0"/>
         </a:xfrm>
       </p:grpSpPr>
-      <p:pic>
-        <p:nvPicPr>
-          <p:cNvPr id="2" name="Picture 8" descr="raised_paper.png"/>
-          <p:cNvPicPr>
-            <a:picLocks noChangeAspect="1"/>
-          </p:cNvPicPr>
-          <p:nvPr userDrawn="1"/>
-        </p:nvPicPr>
-        <p:blipFill>
-          <a:blip r:embed="rId3">
-            <a:extLst>
-              <a:ext uri="{28A0092B-C50C-407E-A947-70E740481C1C}">
-                <a14:useLocalDpi xmlns:a14="http://schemas.microsoft.com/office/drawing/2010/main" val="0"/>
-              </a:ext>
-            </a:extLst>
-          </a:blip>
-          <a:srcRect/>
-          <a:stretch>
-            <a:fillRect/>
-          </a:stretch>
-        </p:blipFill>
-        <p:spPr bwMode="auto">
-          <a:xfrm>
-            <a:off x="-152400" y="1400175"/>
-            <a:ext cx="9144000" cy="3101975"/>
-          </a:xfrm>
-          <a:prstGeom prst="rect">
-            <a:avLst/>
-          </a:prstGeom>
-          <a:noFill/>
-          <a:ln>
-            <a:noFill/>
-          </a:ln>
-          <a:extLst>
-            <a:ext uri="{909E8E84-426E-40dd-AFC4-6F175D3DCCD1}">
-              <a14:hiddenFill xmlns:a14="http://schemas.microsoft.com/office/drawing/2010/main">
-                <a:solidFill>
-                  <a:srgbClr val="FFFFFF"/>
-                </a:solidFill>
-              </a14:hiddenFill>
-            </a:ext>
-            <a:ext uri="{91240B29-F687-4f45-9708-019B960494DF}">
-              <a14:hiddenLine xmlns:a14="http://schemas.microsoft.com/office/drawing/2010/main" w="9525">
-                <a:solidFill>
-                  <a:srgbClr val="000000"/>
-                </a:solidFill>
-                <a:miter lim="800000"/>
-                <a:headEnd/>
-                <a:tailEnd/>
-              </a14:hiddenLine>
-            </a:ext>
-          </a:extLst>
-        </p:spPr>
-      </p:pic>
       <p:sp>
         <p:nvSpPr>
           <p:cNvPr id="3" name="TextBox 2"/>
@@ -1902,60 +1848,6 @@
           </a:p>
         </p:txBody>
       </p:sp>
-      <p:pic>
-        <p:nvPicPr>
-          <p:cNvPr id="4" name="Picture 1"/>
-          <p:cNvPicPr>
-            <a:picLocks noChangeAspect="1"/>
-          </p:cNvPicPr>
-          <p:nvPr userDrawn="1"/>
-        </p:nvPicPr>
-        <p:blipFill>
-          <a:blip r:embed="rId4">
-            <a:extLst>
-              <a:ext uri="{28A0092B-C50C-407E-A947-70E740481C1C}">
-                <a14:useLocalDpi xmlns:a14="http://schemas.microsoft.com/office/drawing/2010/main" val="0"/>
-              </a:ext>
-            </a:extLst>
-          </a:blip>
-          <a:srcRect/>
-          <a:stretch>
-            <a:fillRect/>
-          </a:stretch>
-        </p:blipFill>
-        <p:spPr bwMode="auto">
-          <a:xfrm>
-            <a:off x="3910013" y="388938"/>
-            <a:ext cx="1290637" cy="757237"/>
-          </a:xfrm>
-          <a:prstGeom prst="rect">
-            <a:avLst/>
-          </a:prstGeom>
-          <a:noFill/>
-          <a:ln>
-            <a:noFill/>
-          </a:ln>
-          <a:extLst>
-            <a:ext uri="{909E8E84-426E-40dd-AFC4-6F175D3DCCD1}">
-              <a14:hiddenFill xmlns:a14="http://schemas.microsoft.com/office/drawing/2010/main">
-                <a:solidFill>
-                  <a:srgbClr val="FFFFFF"/>
-                </a:solidFill>
-              </a14:hiddenFill>
-            </a:ext>
-            <a:ext uri="{91240B29-F687-4f45-9708-019B960494DF}">
-              <a14:hiddenLine xmlns:a14="http://schemas.microsoft.com/office/drawing/2010/main" w="9525">
-                <a:solidFill>
-                  <a:srgbClr val="000000"/>
-                </a:solidFill>
-                <a:miter lim="800000"/>
-                <a:headEnd/>
-                <a:tailEnd/>
-              </a14:hiddenLine>
-            </a:ext>
-          </a:extLst>
-        </p:spPr>
-      </p:pic>
       <p:sp>
         <p:nvSpPr>
           <p:cNvPr id="5" name="Date Placeholder 3"/>
@@ -1983,7 +1875,7 @@
               <a:pPr>
                 <a:defRPr/>
               </a:pPr>
-              <a:t>7/26/11</a:t>
+              <a:t>8/19/11</a:t>
             </a:fld>
             <a:endParaRPr lang="en-US"/>
           </a:p>
@@ -2273,7 +2165,7 @@
               <a:pPr>
                 <a:defRPr/>
               </a:pPr>
-              <a:t>7/26/11</a:t>
+              <a:t>8/19/11</a:t>
             </a:fld>
             <a:endParaRPr lang="en-US"/>
           </a:p>
@@ -2470,7 +2362,7 @@
               <a:pPr>
                 <a:defRPr/>
               </a:pPr>
-              <a:t>7/26/11</a:t>
+              <a:t>8/19/11</a:t>
             </a:fld>
             <a:endParaRPr lang="en-US"/>
           </a:p>
@@ -2677,7 +2569,7 @@
               <a:pPr>
                 <a:defRPr/>
               </a:pPr>
-              <a:t>7/26/11</a:t>
+              <a:t>8/19/11</a:t>
             </a:fld>
             <a:endParaRPr lang="en-US"/>
           </a:p>
@@ -2946,7 +2838,7 @@
               <a:pPr>
                 <a:defRPr/>
               </a:pPr>
-              <a:t>7/26/11</a:t>
+              <a:t>8/19/11</a:t>
             </a:fld>
             <a:endParaRPr lang="en-US"/>
           </a:p>
@@ -3143,7 +3035,7 @@
               <a:pPr>
                 <a:defRPr/>
               </a:pPr>
-              <a:t>7/26/11</a:t>
+              <a:t>8/19/11</a:t>
             </a:fld>
             <a:endParaRPr lang="en-US"/>
           </a:p>
@@ -3416,7 +3308,7 @@
               <a:pPr>
                 <a:defRPr/>
               </a:pPr>
-              <a:t>7/26/11</a:t>
+              <a:t>8/19/11</a:t>
             </a:fld>
             <a:endParaRPr lang="en-US"/>
           </a:p>
@@ -3731,7 +3623,7 @@
               <a:pPr>
                 <a:defRPr/>
               </a:pPr>
-              <a:t>7/26/11</a:t>
+              <a:t>8/19/11</a:t>
             </a:fld>
             <a:endParaRPr lang="en-US"/>
           </a:p>
@@ -4180,7 +4072,7 @@
               <a:pPr>
                 <a:defRPr/>
               </a:pPr>
-              <a:t>7/26/11</a:t>
+              <a:t>8/19/11</a:t>
             </a:fld>
             <a:endParaRPr lang="en-US"/>
           </a:p>
@@ -4325,7 +4217,7 @@
               <a:pPr>
                 <a:defRPr/>
               </a:pPr>
-              <a:t>7/26/11</a:t>
+              <a:t>8/19/11</a:t>
             </a:fld>
             <a:endParaRPr lang="en-US"/>
           </a:p>
@@ -4447,7 +4339,7 @@
               <a:pPr>
                 <a:defRPr/>
               </a:pPr>
-              <a:t>7/26/11</a:t>
+              <a:t>8/19/11</a:t>
             </a:fld>
             <a:endParaRPr lang="en-US"/>
           </a:p>
@@ -4665,7 +4557,7 @@
               <a:pPr>
                 <a:defRPr/>
               </a:pPr>
-              <a:t>7/26/11</a:t>
+              <a:t>8/19/11</a:t>
             </a:fld>
             <a:endParaRPr lang="en-US"/>
           </a:p>
@@ -4969,7 +4861,7 @@
               <a:pPr>
                 <a:defRPr/>
               </a:pPr>
-              <a:t>7/26/11</a:t>
+              <a:t>8/19/11</a:t>
             </a:fld>
             <a:endParaRPr lang="en-US"/>
           </a:p>
@@ -5252,7 +5144,7 @@
               <a:pPr>
                 <a:defRPr/>
               </a:pPr>
-              <a:t>7/26/11</a:t>
+              <a:t>8/19/11</a:t>
             </a:fld>
             <a:endParaRPr lang="en-US"/>
           </a:p>
@@ -5449,7 +5341,7 @@
               <a:pPr>
                 <a:defRPr/>
               </a:pPr>
-              <a:t>7/26/11</a:t>
+              <a:t>8/19/11</a:t>
             </a:fld>
             <a:endParaRPr lang="en-US"/>
           </a:p>
@@ -5656,7 +5548,7 @@
               <a:pPr>
                 <a:defRPr/>
               </a:pPr>
-              <a:t>7/26/11</a:t>
+              <a:t>8/19/11</a:t>
             </a:fld>
             <a:endParaRPr lang="en-US"/>
           </a:p>
@@ -6164,7 +6056,7 @@
               <a:pPr>
                 <a:defRPr/>
               </a:pPr>
-              <a:t>7/26/11</a:t>
+              <a:t>8/19/11</a:t>
             </a:fld>
             <a:endParaRPr lang="en-US"/>
           </a:p>
@@ -6470,7 +6362,7 @@
               <a:pPr>
                 <a:defRPr/>
               </a:pPr>
-              <a:t>7/26/11</a:t>
+              <a:t>8/19/11</a:t>
             </a:fld>
             <a:endParaRPr lang="en-US"/>
           </a:p>
@@ -6794,7 +6686,7 @@
               <a:pPr>
                 <a:defRPr/>
               </a:pPr>
-              <a:t>7/26/11</a:t>
+              <a:t>8/19/11</a:t>
             </a:fld>
             <a:endParaRPr lang="en-US"/>
           </a:p>
@@ -7243,7 +7135,7 @@
               <a:pPr>
                 <a:defRPr/>
               </a:pPr>
-              <a:t>7/26/11</a:t>
+              <a:t>8/19/11</a:t>
             </a:fld>
             <a:endParaRPr lang="en-US"/>
           </a:p>
@@ -7388,7 +7280,7 @@
               <a:pPr>
                 <a:defRPr/>
               </a:pPr>
-              <a:t>7/26/11</a:t>
+              <a:t>8/19/11</a:t>
             </a:fld>
             <a:endParaRPr lang="en-US"/>
           </a:p>
@@ -7510,7 +7402,7 @@
               <a:pPr>
                 <a:defRPr/>
               </a:pPr>
-              <a:t>7/26/11</a:t>
+              <a:t>8/19/11</a:t>
             </a:fld>
             <a:endParaRPr lang="en-US"/>
           </a:p>
@@ -7814,7 +7706,7 @@
               <a:pPr>
                 <a:defRPr/>
               </a:pPr>
-              <a:t>7/26/11</a:t>
+              <a:t>8/19/11</a:t>
             </a:fld>
             <a:endParaRPr lang="en-US"/>
           </a:p>
@@ -8100,7 +7992,7 @@
               <a:pPr>
                 <a:defRPr/>
               </a:pPr>
-              <a:t>7/26/11</a:t>
+              <a:t>8/19/11</a:t>
             </a:fld>
             <a:endParaRPr lang="en-US"/>
           </a:p>
@@ -9070,7 +8962,7 @@
               <a:pPr>
                 <a:defRPr/>
               </a:pPr>
-              <a:t>7/26/11</a:t>
+              <a:t>8/19/11</a:t>
             </a:fld>
             <a:endParaRPr lang="en-US"/>
           </a:p>
@@ -9766,7 +9658,7 @@
       </p:sp>
       <p:pic>
         <p:nvPicPr>
-          <p:cNvPr id="28675" name="Picture 1"/>
+          <p:cNvPr id="5" name="Picture 8" descr="raised_paper.png"/>
           <p:cNvPicPr>
             <a:picLocks noChangeAspect="1"/>
           </p:cNvPicPr>
@@ -9787,8 +9679,8 @@
         </p:blipFill>
         <p:spPr bwMode="auto">
           <a:xfrm>
-            <a:off x="3910013" y="388938"/>
-            <a:ext cx="1290637" cy="757237"/>
+            <a:off x="-40106" y="1640564"/>
+            <a:ext cx="8915400" cy="3352800"/>
           </a:xfrm>
           <a:prstGeom prst="rect">
             <a:avLst/>
@@ -9820,7 +9712,7 @@
       </p:pic>
       <p:sp>
         <p:nvSpPr>
-          <p:cNvPr id="28676" name="Title 11"/>
+          <p:cNvPr id="6" name="Title 1"/>
           <p:cNvSpPr txBox="1">
             <a:spLocks/>
           </p:cNvSpPr>
@@ -9828,8 +9720,301 @@
         </p:nvSpPr>
         <p:spPr bwMode="auto">
           <a:xfrm>
-            <a:off x="762000" y="2500313"/>
-            <a:ext cx="7713663" cy="949325"/>
+            <a:off x="-27406" y="2478764"/>
+            <a:ext cx="9144000" cy="1470025"/>
+          </a:xfrm>
+          <a:prstGeom prst="rect">
+            <a:avLst/>
+          </a:prstGeom>
+          <a:noFill/>
+          <a:ln>
+            <a:noFill/>
+            <a:miter lim="800000"/>
+            <a:headEnd/>
+            <a:tailEnd/>
+          </a:ln>
+          <a:effectLst>
+            <a:innerShdw blurRad="63500" dist="50800" dir="13500000">
+              <a:prstClr val="black">
+                <a:alpha val="50000"/>
+              </a:prstClr>
+            </a:innerShdw>
+          </a:effectLst>
+          <a:extLst>
+            <a:ext uri="{909E8E84-426E-40dd-AFC4-6F175D3DCCD1}">
+              <a14:hiddenFill xmlns:a14="http://schemas.microsoft.com/office/drawing/2010/main">
+                <a:solidFill>
+                  <a:srgbClr val="FFFFFF"/>
+                </a:solidFill>
+              </a14:hiddenFill>
+            </a:ext>
+            <a:ext uri="{91240B29-F687-4f45-9708-019B960494DF}">
+              <a14:hiddenLine xmlns:a14="http://schemas.microsoft.com/office/drawing/2010/main" w="9525">
+                <a:solidFill>
+                  <a:srgbClr val="000000"/>
+                </a:solidFill>
+                <a:miter lim="800000"/>
+                <a:headEnd/>
+                <a:tailEnd/>
+              </a14:hiddenLine>
+            </a:ext>
+            <a:ext uri="{FAA26D3D-D897-4be2-8F04-BA451C77F1D7}">
+              <ma14:placeholderFlag xmlns:ma14="http://schemas.microsoft.com/office/mac/drawingml/2011/main" val="1"/>
+            </a:ext>
+          </a:extLst>
+        </p:spPr>
+        <p:txBody>
+          <a:bodyPr vert="horz" wrap="square" lIns="91440" tIns="45720" rIns="91440" bIns="45720" numCol="1" anchor="ctr" anchorCtr="0" compatLnSpc="1">
+            <a:prstTxWarp prst="textNoShape">
+              <a:avLst/>
+            </a:prstTxWarp>
+          </a:bodyPr>
+          <a:lstStyle>
+            <a:lvl1pPr algn="l" defTabSz="457200" rtl="0" eaLnBrk="0" fontAlgn="base" hangingPunct="0">
+              <a:spcBef>
+                <a:spcPct val="0"/>
+              </a:spcBef>
+              <a:spcAft>
+                <a:spcPct val="0"/>
+              </a:spcAft>
+              <a:defRPr sz="3200" b="1" kern="1200">
+                <a:solidFill>
+                  <a:schemeClr val="tx1"/>
+                </a:solidFill>
+                <a:latin typeface="+mj-lt"/>
+                <a:ea typeface="ＭＳ Ｐゴシック" charset="0"/>
+                <a:cs typeface="ＭＳ Ｐゴシック" charset="0"/>
+              </a:defRPr>
+            </a:lvl1pPr>
+            <a:lvl2pPr algn="l" defTabSz="457200" rtl="0" eaLnBrk="0" fontAlgn="base" hangingPunct="0">
+              <a:spcBef>
+                <a:spcPct val="0"/>
+              </a:spcBef>
+              <a:spcAft>
+                <a:spcPct val="0"/>
+              </a:spcAft>
+              <a:defRPr sz="3200" b="1">
+                <a:solidFill>
+                  <a:schemeClr val="tx1"/>
+                </a:solidFill>
+                <a:latin typeface="Trebuchet MS" charset="0"/>
+                <a:ea typeface="ＭＳ Ｐゴシック" charset="0"/>
+                <a:cs typeface="ＭＳ Ｐゴシック" charset="0"/>
+              </a:defRPr>
+            </a:lvl2pPr>
+            <a:lvl3pPr algn="l" defTabSz="457200" rtl="0" eaLnBrk="0" fontAlgn="base" hangingPunct="0">
+              <a:spcBef>
+                <a:spcPct val="0"/>
+              </a:spcBef>
+              <a:spcAft>
+                <a:spcPct val="0"/>
+              </a:spcAft>
+              <a:defRPr sz="3200" b="1">
+                <a:solidFill>
+                  <a:schemeClr val="tx1"/>
+                </a:solidFill>
+                <a:latin typeface="Trebuchet MS" charset="0"/>
+                <a:ea typeface="ＭＳ Ｐゴシック" charset="0"/>
+                <a:cs typeface="ＭＳ Ｐゴシック" charset="0"/>
+              </a:defRPr>
+            </a:lvl3pPr>
+            <a:lvl4pPr algn="l" defTabSz="457200" rtl="0" eaLnBrk="0" fontAlgn="base" hangingPunct="0">
+              <a:spcBef>
+                <a:spcPct val="0"/>
+              </a:spcBef>
+              <a:spcAft>
+                <a:spcPct val="0"/>
+              </a:spcAft>
+              <a:defRPr sz="3200" b="1">
+                <a:solidFill>
+                  <a:schemeClr val="tx1"/>
+                </a:solidFill>
+                <a:latin typeface="Trebuchet MS" charset="0"/>
+                <a:ea typeface="ＭＳ Ｐゴシック" charset="0"/>
+                <a:cs typeface="ＭＳ Ｐゴシック" charset="0"/>
+              </a:defRPr>
+            </a:lvl4pPr>
+            <a:lvl5pPr algn="l" defTabSz="457200" rtl="0" eaLnBrk="0" fontAlgn="base" hangingPunct="0">
+              <a:spcBef>
+                <a:spcPct val="0"/>
+              </a:spcBef>
+              <a:spcAft>
+                <a:spcPct val="0"/>
+              </a:spcAft>
+              <a:defRPr sz="3200" b="1">
+                <a:solidFill>
+                  <a:schemeClr val="tx1"/>
+                </a:solidFill>
+                <a:latin typeface="Trebuchet MS" charset="0"/>
+                <a:ea typeface="ＭＳ Ｐゴシック" charset="0"/>
+                <a:cs typeface="ＭＳ Ｐゴシック" charset="0"/>
+              </a:defRPr>
+            </a:lvl5pPr>
+            <a:lvl6pPr marL="457200" algn="ctr" defTabSz="457200" rtl="0" eaLnBrk="1" fontAlgn="base" hangingPunct="1">
+              <a:spcBef>
+                <a:spcPct val="0"/>
+              </a:spcBef>
+              <a:spcAft>
+                <a:spcPct val="0"/>
+              </a:spcAft>
+              <a:defRPr sz="4400">
+                <a:solidFill>
+                  <a:schemeClr val="tx1"/>
+                </a:solidFill>
+                <a:latin typeface="Trebuchet MS" charset="0"/>
+                <a:ea typeface="ＭＳ Ｐゴシック" charset="0"/>
+                <a:cs typeface="ＭＳ Ｐゴシック" charset="0"/>
+              </a:defRPr>
+            </a:lvl6pPr>
+            <a:lvl7pPr marL="914400" algn="ctr" defTabSz="457200" rtl="0" eaLnBrk="1" fontAlgn="base" hangingPunct="1">
+              <a:spcBef>
+                <a:spcPct val="0"/>
+              </a:spcBef>
+              <a:spcAft>
+                <a:spcPct val="0"/>
+              </a:spcAft>
+              <a:defRPr sz="4400">
+                <a:solidFill>
+                  <a:schemeClr val="tx1"/>
+                </a:solidFill>
+                <a:latin typeface="Trebuchet MS" charset="0"/>
+                <a:ea typeface="ＭＳ Ｐゴシック" charset="0"/>
+                <a:cs typeface="ＭＳ Ｐゴシック" charset="0"/>
+              </a:defRPr>
+            </a:lvl7pPr>
+            <a:lvl8pPr marL="1371600" algn="ctr" defTabSz="457200" rtl="0" eaLnBrk="1" fontAlgn="base" hangingPunct="1">
+              <a:spcBef>
+                <a:spcPct val="0"/>
+              </a:spcBef>
+              <a:spcAft>
+                <a:spcPct val="0"/>
+              </a:spcAft>
+              <a:defRPr sz="4400">
+                <a:solidFill>
+                  <a:schemeClr val="tx1"/>
+                </a:solidFill>
+                <a:latin typeface="Trebuchet MS" charset="0"/>
+                <a:ea typeface="ＭＳ Ｐゴシック" charset="0"/>
+                <a:cs typeface="ＭＳ Ｐゴシック" charset="0"/>
+              </a:defRPr>
+            </a:lvl8pPr>
+            <a:lvl9pPr marL="1828800" algn="ctr" defTabSz="457200" rtl="0" eaLnBrk="1" fontAlgn="base" hangingPunct="1">
+              <a:spcBef>
+                <a:spcPct val="0"/>
+              </a:spcBef>
+              <a:spcAft>
+                <a:spcPct val="0"/>
+              </a:spcAft>
+              <a:defRPr sz="4400">
+                <a:solidFill>
+                  <a:schemeClr val="tx1"/>
+                </a:solidFill>
+                <a:latin typeface="Trebuchet MS" charset="0"/>
+                <a:ea typeface="ＭＳ Ｐゴシック" charset="0"/>
+                <a:cs typeface="ＭＳ Ｐゴシック" charset="0"/>
+              </a:defRPr>
+            </a:lvl9pPr>
+          </a:lstStyle>
+          <a:p>
+            <a:pPr marL="39688" algn="ctr" eaLnBrk="1" hangingPunct="1">
+              <a:defRPr/>
+            </a:pPr>
+            <a:r>
+              <a:rPr lang="en-US" sz="4400" i="1" dirty="0" smtClean="0">
+                <a:solidFill>
+                  <a:schemeClr val="accent6"/>
+                </a:solidFill>
+                <a:effectLst>
+                  <a:innerShdw blurRad="63500" dist="50800" dir="13500000">
+                    <a:prstClr val="black">
+                      <a:alpha val="50000"/>
+                    </a:prstClr>
+                  </a:innerShdw>
+                </a:effectLst>
+                <a:latin typeface="Trebuchet MS Bold" charset="0"/>
+                <a:cs typeface="Trebuchet MS Bold" charset="0"/>
+                <a:sym typeface="Trebuchet MS Bold" charset="0"/>
+              </a:rPr>
+              <a:t>Advanced Titanium</a:t>
+            </a:r>
+            <a:br>
+              <a:rPr lang="en-US" sz="4400" i="1" dirty="0" smtClean="0">
+                <a:solidFill>
+                  <a:schemeClr val="accent6"/>
+                </a:solidFill>
+                <a:effectLst>
+                  <a:innerShdw blurRad="63500" dist="50800" dir="13500000">
+                    <a:prstClr val="black">
+                      <a:alpha val="50000"/>
+                    </a:prstClr>
+                  </a:innerShdw>
+                </a:effectLst>
+                <a:latin typeface="Trebuchet MS Bold" charset="0"/>
+                <a:cs typeface="Trebuchet MS Bold" charset="0"/>
+                <a:sym typeface="Trebuchet MS Bold" charset="0"/>
+              </a:rPr>
+            </a:br>
+            <a:r>
+              <a:rPr lang="en-US" sz="4400" i="1" dirty="0" smtClean="0">
+                <a:solidFill>
+                  <a:schemeClr val="accent6"/>
+                </a:solidFill>
+                <a:effectLst>
+                  <a:innerShdw blurRad="63500" dist="50800" dir="13500000">
+                    <a:prstClr val="black">
+                      <a:alpha val="50000"/>
+                    </a:prstClr>
+                  </a:innerShdw>
+                </a:effectLst>
+                <a:latin typeface="Trebuchet MS Bold" charset="0"/>
+                <a:cs typeface="Trebuchet MS Bold" charset="0"/>
+                <a:sym typeface="Trebuchet MS Bold" charset="0"/>
+              </a:rPr>
+              <a:t>Mobile Development</a:t>
+            </a:r>
+            <a:endParaRPr lang="en-US" sz="4400" i="1" dirty="0">
+              <a:solidFill>
+                <a:schemeClr val="accent6"/>
+              </a:solidFill>
+              <a:effectLst>
+                <a:innerShdw blurRad="63500" dist="50800" dir="13500000">
+                  <a:prstClr val="black">
+                    <a:alpha val="50000"/>
+                  </a:prstClr>
+                </a:innerShdw>
+              </a:effectLst>
+              <a:latin typeface="Trebuchet MS Bold" charset="0"/>
+              <a:cs typeface="Trebuchet MS Bold" charset="0"/>
+              <a:sym typeface="Trebuchet MS Bold" charset="0"/>
+            </a:endParaRPr>
+          </a:p>
+        </p:txBody>
+      </p:sp>
+      <p:pic>
+        <p:nvPicPr>
+          <p:cNvPr id="7" name="Picture 8"/>
+          <p:cNvPicPr>
+            <a:picLocks noChangeAspect="1"/>
+          </p:cNvPicPr>
+          <p:nvPr/>
+        </p:nvPicPr>
+        <p:blipFill>
+          <a:blip r:embed="rId5">
+            <a:extLst>
+              <a:ext uri="{28A0092B-C50C-407E-A947-70E740481C1C}">
+                <a14:useLocalDpi xmlns:a14="http://schemas.microsoft.com/office/drawing/2010/main" val="0"/>
+              </a:ext>
+            </a:extLst>
+          </a:blip>
+          <a:srcRect/>
+          <a:stretch>
+            <a:fillRect/>
+          </a:stretch>
+        </p:blipFill>
+        <p:spPr bwMode="auto">
+          <a:xfrm>
+            <a:off x="3923882" y="1792964"/>
+            <a:ext cx="1230312" cy="685800"/>
           </a:xfrm>
           <a:prstGeom prst="rect">
             <a:avLst/>
@@ -9858,136 +10043,7 @@
             </a:ext>
           </a:extLst>
         </p:spPr>
-        <p:txBody>
-          <a:bodyPr/>
-          <a:lstStyle>
-            <a:lvl1pPr eaLnBrk="0" hangingPunct="0">
-              <a:defRPr sz="2400">
-                <a:solidFill>
-                  <a:schemeClr val="tx1"/>
-                </a:solidFill>
-                <a:latin typeface="Trebuchet MS" charset="0"/>
-                <a:ea typeface="ＭＳ Ｐゴシック" charset="0"/>
-                <a:cs typeface="ＭＳ Ｐゴシック" charset="0"/>
-              </a:defRPr>
-            </a:lvl1pPr>
-            <a:lvl2pPr marL="742950" indent="-285750" eaLnBrk="0" hangingPunct="0">
-              <a:defRPr sz="2400">
-                <a:solidFill>
-                  <a:schemeClr val="tx1"/>
-                </a:solidFill>
-                <a:latin typeface="Trebuchet MS" charset="0"/>
-                <a:ea typeface="ＭＳ Ｐゴシック" charset="0"/>
-              </a:defRPr>
-            </a:lvl2pPr>
-            <a:lvl3pPr marL="1143000" indent="-228600" eaLnBrk="0" hangingPunct="0">
-              <a:defRPr sz="2400">
-                <a:solidFill>
-                  <a:schemeClr val="tx1"/>
-                </a:solidFill>
-                <a:latin typeface="Trebuchet MS" charset="0"/>
-                <a:ea typeface="ＭＳ Ｐゴシック" charset="0"/>
-              </a:defRPr>
-            </a:lvl3pPr>
-            <a:lvl4pPr marL="1600200" indent="-228600" eaLnBrk="0" hangingPunct="0">
-              <a:defRPr sz="2400">
-                <a:solidFill>
-                  <a:schemeClr val="tx1"/>
-                </a:solidFill>
-                <a:latin typeface="Trebuchet MS" charset="0"/>
-                <a:ea typeface="ＭＳ Ｐゴシック" charset="0"/>
-              </a:defRPr>
-            </a:lvl4pPr>
-            <a:lvl5pPr marL="2057400" indent="-228600" eaLnBrk="0" hangingPunct="0">
-              <a:defRPr sz="2400">
-                <a:solidFill>
-                  <a:schemeClr val="tx1"/>
-                </a:solidFill>
-                <a:latin typeface="Trebuchet MS" charset="0"/>
-                <a:ea typeface="ＭＳ Ｐゴシック" charset="0"/>
-              </a:defRPr>
-            </a:lvl5pPr>
-            <a:lvl6pPr marL="2514600" indent="-228600" eaLnBrk="0" fontAlgn="base" hangingPunct="0">
-              <a:spcBef>
-                <a:spcPct val="0"/>
-              </a:spcBef>
-              <a:spcAft>
-                <a:spcPct val="0"/>
-              </a:spcAft>
-              <a:defRPr sz="2400">
-                <a:solidFill>
-                  <a:schemeClr val="tx1"/>
-                </a:solidFill>
-                <a:latin typeface="Trebuchet MS" charset="0"/>
-                <a:ea typeface="ＭＳ Ｐゴシック" charset="0"/>
-              </a:defRPr>
-            </a:lvl6pPr>
-            <a:lvl7pPr marL="2971800" indent="-228600" eaLnBrk="0" fontAlgn="base" hangingPunct="0">
-              <a:spcBef>
-                <a:spcPct val="0"/>
-              </a:spcBef>
-              <a:spcAft>
-                <a:spcPct val="0"/>
-              </a:spcAft>
-              <a:defRPr sz="2400">
-                <a:solidFill>
-                  <a:schemeClr val="tx1"/>
-                </a:solidFill>
-                <a:latin typeface="Trebuchet MS" charset="0"/>
-                <a:ea typeface="ＭＳ Ｐゴシック" charset="0"/>
-              </a:defRPr>
-            </a:lvl7pPr>
-            <a:lvl8pPr marL="3429000" indent="-228600" eaLnBrk="0" fontAlgn="base" hangingPunct="0">
-              <a:spcBef>
-                <a:spcPct val="0"/>
-              </a:spcBef>
-              <a:spcAft>
-                <a:spcPct val="0"/>
-              </a:spcAft>
-              <a:defRPr sz="2400">
-                <a:solidFill>
-                  <a:schemeClr val="tx1"/>
-                </a:solidFill>
-                <a:latin typeface="Trebuchet MS" charset="0"/>
-                <a:ea typeface="ＭＳ Ｐゴシック" charset="0"/>
-              </a:defRPr>
-            </a:lvl8pPr>
-            <a:lvl9pPr marL="3886200" indent="-228600" eaLnBrk="0" fontAlgn="base" hangingPunct="0">
-              <a:spcBef>
-                <a:spcPct val="0"/>
-              </a:spcBef>
-              <a:spcAft>
-                <a:spcPct val="0"/>
-              </a:spcAft>
-              <a:defRPr sz="2400">
-                <a:solidFill>
-                  <a:schemeClr val="tx1"/>
-                </a:solidFill>
-                <a:latin typeface="Trebuchet MS" charset="0"/>
-                <a:ea typeface="ＭＳ Ｐゴシック" charset="0"/>
-              </a:defRPr>
-            </a:lvl9pPr>
-          </a:lstStyle>
-          <a:p>
-            <a:pPr algn="ctr" eaLnBrk="1" hangingPunct="1"/>
-            <a:r>
-              <a:rPr lang="en-US" sz="4000" b="1" dirty="0" smtClean="0">
-                <a:solidFill>
-                  <a:srgbClr val="122956"/>
-                </a:solidFill>
-                <a:cs typeface="Trebuchet MS" charset="0"/>
-              </a:rPr>
-              <a:t>Advanced Titanium Training</a:t>
-            </a:r>
-            <a:endParaRPr lang="en-US" sz="4000" b="1" dirty="0">
-              <a:solidFill>
-                <a:srgbClr val="122956"/>
-              </a:solidFill>
-              <a:cs typeface="Trebuchet MS" charset="0"/>
-            </a:endParaRPr>
-          </a:p>
-        </p:txBody>
-      </p:sp>
+      </p:pic>
     </p:spTree>
   </p:cSld>
   <p:clrMapOvr>

</xml_diff>

<commit_message>
Updated slide numbering scheme to improve modularity
</commit_message>
<xml_diff>
--- a/000.pptx
+++ b/000.pptx
@@ -240,7 +240,7 @@
               <a:pPr>
                 <a:defRPr/>
               </a:pPr>
-              <a:t>8/19/11</a:t>
+              <a:t>9/27/11</a:t>
             </a:fld>
             <a:endParaRPr lang="en-US"/>
           </a:p>
@@ -423,7 +423,7 @@
               <a:pPr>
                 <a:defRPr/>
               </a:pPr>
-              <a:t>8/19/11</a:t>
+              <a:t>9/27/11</a:t>
             </a:fld>
             <a:endParaRPr lang="en-US"/>
           </a:p>
@@ -1875,7 +1875,7 @@
               <a:pPr>
                 <a:defRPr/>
               </a:pPr>
-              <a:t>8/19/11</a:t>
+              <a:t>9/27/11</a:t>
             </a:fld>
             <a:endParaRPr lang="en-US"/>
           </a:p>
@@ -2165,7 +2165,7 @@
               <a:pPr>
                 <a:defRPr/>
               </a:pPr>
-              <a:t>8/19/11</a:t>
+              <a:t>9/27/11</a:t>
             </a:fld>
             <a:endParaRPr lang="en-US"/>
           </a:p>
@@ -2362,7 +2362,7 @@
               <a:pPr>
                 <a:defRPr/>
               </a:pPr>
-              <a:t>8/19/11</a:t>
+              <a:t>9/27/11</a:t>
             </a:fld>
             <a:endParaRPr lang="en-US"/>
           </a:p>
@@ -2569,7 +2569,7 @@
               <a:pPr>
                 <a:defRPr/>
               </a:pPr>
-              <a:t>8/19/11</a:t>
+              <a:t>9/27/11</a:t>
             </a:fld>
             <a:endParaRPr lang="en-US"/>
           </a:p>
@@ -2838,7 +2838,7 @@
               <a:pPr>
                 <a:defRPr/>
               </a:pPr>
-              <a:t>8/19/11</a:t>
+              <a:t>9/27/11</a:t>
             </a:fld>
             <a:endParaRPr lang="en-US"/>
           </a:p>
@@ -3035,7 +3035,7 @@
               <a:pPr>
                 <a:defRPr/>
               </a:pPr>
-              <a:t>8/19/11</a:t>
+              <a:t>9/27/11</a:t>
             </a:fld>
             <a:endParaRPr lang="en-US"/>
           </a:p>
@@ -3308,7 +3308,7 @@
               <a:pPr>
                 <a:defRPr/>
               </a:pPr>
-              <a:t>8/19/11</a:t>
+              <a:t>9/27/11</a:t>
             </a:fld>
             <a:endParaRPr lang="en-US"/>
           </a:p>
@@ -3623,7 +3623,7 @@
               <a:pPr>
                 <a:defRPr/>
               </a:pPr>
-              <a:t>8/19/11</a:t>
+              <a:t>9/27/11</a:t>
             </a:fld>
             <a:endParaRPr lang="en-US"/>
           </a:p>
@@ -4072,7 +4072,7 @@
               <a:pPr>
                 <a:defRPr/>
               </a:pPr>
-              <a:t>8/19/11</a:t>
+              <a:t>9/27/11</a:t>
             </a:fld>
             <a:endParaRPr lang="en-US"/>
           </a:p>
@@ -4217,7 +4217,7 @@
               <a:pPr>
                 <a:defRPr/>
               </a:pPr>
-              <a:t>8/19/11</a:t>
+              <a:t>9/27/11</a:t>
             </a:fld>
             <a:endParaRPr lang="en-US"/>
           </a:p>
@@ -4339,7 +4339,7 @@
               <a:pPr>
                 <a:defRPr/>
               </a:pPr>
-              <a:t>8/19/11</a:t>
+              <a:t>9/27/11</a:t>
             </a:fld>
             <a:endParaRPr lang="en-US"/>
           </a:p>
@@ -4557,7 +4557,7 @@
               <a:pPr>
                 <a:defRPr/>
               </a:pPr>
-              <a:t>8/19/11</a:t>
+              <a:t>9/27/11</a:t>
             </a:fld>
             <a:endParaRPr lang="en-US"/>
           </a:p>
@@ -4861,7 +4861,7 @@
               <a:pPr>
                 <a:defRPr/>
               </a:pPr>
-              <a:t>8/19/11</a:t>
+              <a:t>9/27/11</a:t>
             </a:fld>
             <a:endParaRPr lang="en-US"/>
           </a:p>
@@ -5144,7 +5144,7 @@
               <a:pPr>
                 <a:defRPr/>
               </a:pPr>
-              <a:t>8/19/11</a:t>
+              <a:t>9/27/11</a:t>
             </a:fld>
             <a:endParaRPr lang="en-US"/>
           </a:p>
@@ -5341,7 +5341,7 @@
               <a:pPr>
                 <a:defRPr/>
               </a:pPr>
-              <a:t>8/19/11</a:t>
+              <a:t>9/27/11</a:t>
             </a:fld>
             <a:endParaRPr lang="en-US"/>
           </a:p>
@@ -5548,7 +5548,7 @@
               <a:pPr>
                 <a:defRPr/>
               </a:pPr>
-              <a:t>8/19/11</a:t>
+              <a:t>9/27/11</a:t>
             </a:fld>
             <a:endParaRPr lang="en-US"/>
           </a:p>
@@ -6056,7 +6056,7 @@
               <a:pPr>
                 <a:defRPr/>
               </a:pPr>
-              <a:t>8/19/11</a:t>
+              <a:t>9/27/11</a:t>
             </a:fld>
             <a:endParaRPr lang="en-US"/>
           </a:p>
@@ -6362,7 +6362,7 @@
               <a:pPr>
                 <a:defRPr/>
               </a:pPr>
-              <a:t>8/19/11</a:t>
+              <a:t>9/27/11</a:t>
             </a:fld>
             <a:endParaRPr lang="en-US"/>
           </a:p>
@@ -6686,7 +6686,7 @@
               <a:pPr>
                 <a:defRPr/>
               </a:pPr>
-              <a:t>8/19/11</a:t>
+              <a:t>9/27/11</a:t>
             </a:fld>
             <a:endParaRPr lang="en-US"/>
           </a:p>
@@ -7135,7 +7135,7 @@
               <a:pPr>
                 <a:defRPr/>
               </a:pPr>
-              <a:t>8/19/11</a:t>
+              <a:t>9/27/11</a:t>
             </a:fld>
             <a:endParaRPr lang="en-US"/>
           </a:p>
@@ -7280,7 +7280,7 @@
               <a:pPr>
                 <a:defRPr/>
               </a:pPr>
-              <a:t>8/19/11</a:t>
+              <a:t>9/27/11</a:t>
             </a:fld>
             <a:endParaRPr lang="en-US"/>
           </a:p>
@@ -7402,7 +7402,7 @@
               <a:pPr>
                 <a:defRPr/>
               </a:pPr>
-              <a:t>8/19/11</a:t>
+              <a:t>9/27/11</a:t>
             </a:fld>
             <a:endParaRPr lang="en-US"/>
           </a:p>
@@ -7706,7 +7706,7 @@
               <a:pPr>
                 <a:defRPr/>
               </a:pPr>
-              <a:t>8/19/11</a:t>
+              <a:t>9/27/11</a:t>
             </a:fld>
             <a:endParaRPr lang="en-US"/>
           </a:p>
@@ -7992,7 +7992,7 @@
               <a:pPr>
                 <a:defRPr/>
               </a:pPr>
-              <a:t>8/19/11</a:t>
+              <a:t>9/27/11</a:t>
             </a:fld>
             <a:endParaRPr lang="en-US"/>
           </a:p>
@@ -8962,7 +8962,7 @@
               <a:pPr>
                 <a:defRPr/>
               </a:pPr>
-              <a:t>8/19/11</a:t>
+              <a:t>9/27/11</a:t>
             </a:fld>
             <a:endParaRPr lang="en-US"/>
           </a:p>
@@ -10044,6 +10044,186 @@
           </a:extLst>
         </p:spPr>
       </p:pic>
+      <p:sp>
+        <p:nvSpPr>
+          <p:cNvPr id="8" name="Slide Number Placeholder 5"/>
+          <p:cNvSpPr>
+            <a:spLocks noGrp="1"/>
+          </p:cNvSpPr>
+          <p:nvPr>
+            <p:ph type="sldNum" sz="quarter" idx="12"/>
+          </p:nvPr>
+        </p:nvSpPr>
+        <p:spPr bwMode="auto">
+          <a:xfrm>
+            <a:off x="203200" y="6400800"/>
+            <a:ext cx="2133600" cy="365125"/>
+          </a:xfrm>
+          <a:noFill/>
+          <a:extLst>
+            <a:ext uri="{909E8E84-426E-40dd-AFC4-6F175D3DCCD1}">
+              <a14:hiddenFill xmlns:a14="http://schemas.microsoft.com/office/drawing/2010/main">
+                <a:solidFill>
+                  <a:srgbClr val="FFFFFF"/>
+                </a:solidFill>
+              </a14:hiddenFill>
+            </a:ext>
+            <a:ext uri="{91240B29-F687-4f45-9708-019B960494DF}">
+              <a14:hiddenLine xmlns:a14="http://schemas.microsoft.com/office/drawing/2010/main" w="9525">
+                <a:solidFill>
+                  <a:srgbClr val="000000"/>
+                </a:solidFill>
+                <a:miter lim="800000"/>
+                <a:headEnd/>
+                <a:tailEnd/>
+              </a14:hiddenLine>
+            </a:ext>
+          </a:extLst>
+        </p:spPr>
+        <p:txBody>
+          <a:bodyPr vert="horz" wrap="square" lIns="91440" tIns="45720" rIns="91440" bIns="45720" numCol="1" anchor="ctr" anchorCtr="0" compatLnSpc="1">
+            <a:prstTxWarp prst="textNoShape">
+              <a:avLst/>
+            </a:prstTxWarp>
+          </a:bodyPr>
+          <a:lstStyle>
+            <a:lvl1pPr eaLnBrk="0" hangingPunct="0">
+              <a:defRPr sz="2400">
+                <a:solidFill>
+                  <a:schemeClr val="tx1"/>
+                </a:solidFill>
+                <a:latin typeface="Trebuchet MS" charset="0"/>
+                <a:ea typeface="ＭＳ Ｐゴシック" charset="0"/>
+                <a:cs typeface="ＭＳ Ｐゴシック" charset="0"/>
+              </a:defRPr>
+            </a:lvl1pPr>
+            <a:lvl2pPr marL="742950" indent="-285750" eaLnBrk="0" hangingPunct="0">
+              <a:defRPr sz="2400">
+                <a:solidFill>
+                  <a:schemeClr val="tx1"/>
+                </a:solidFill>
+                <a:latin typeface="Trebuchet MS" charset="0"/>
+                <a:ea typeface="ＭＳ Ｐゴシック" charset="0"/>
+              </a:defRPr>
+            </a:lvl2pPr>
+            <a:lvl3pPr marL="1143000" indent="-228600" eaLnBrk="0" hangingPunct="0">
+              <a:defRPr sz="2400">
+                <a:solidFill>
+                  <a:schemeClr val="tx1"/>
+                </a:solidFill>
+                <a:latin typeface="Trebuchet MS" charset="0"/>
+                <a:ea typeface="ＭＳ Ｐゴシック" charset="0"/>
+              </a:defRPr>
+            </a:lvl3pPr>
+            <a:lvl4pPr marL="1600200" indent="-228600" eaLnBrk="0" hangingPunct="0">
+              <a:defRPr sz="2400">
+                <a:solidFill>
+                  <a:schemeClr val="tx1"/>
+                </a:solidFill>
+                <a:latin typeface="Trebuchet MS" charset="0"/>
+                <a:ea typeface="ＭＳ Ｐゴシック" charset="0"/>
+              </a:defRPr>
+            </a:lvl4pPr>
+            <a:lvl5pPr marL="2057400" indent="-228600" eaLnBrk="0" hangingPunct="0">
+              <a:defRPr sz="2400">
+                <a:solidFill>
+                  <a:schemeClr val="tx1"/>
+                </a:solidFill>
+                <a:latin typeface="Trebuchet MS" charset="0"/>
+                <a:ea typeface="ＭＳ Ｐゴシック" charset="0"/>
+              </a:defRPr>
+            </a:lvl5pPr>
+            <a:lvl6pPr marL="2514600" indent="-228600" eaLnBrk="0" fontAlgn="base" hangingPunct="0">
+              <a:spcBef>
+                <a:spcPct val="0"/>
+              </a:spcBef>
+              <a:spcAft>
+                <a:spcPct val="0"/>
+              </a:spcAft>
+              <a:defRPr sz="2400">
+                <a:solidFill>
+                  <a:schemeClr val="tx1"/>
+                </a:solidFill>
+                <a:latin typeface="Trebuchet MS" charset="0"/>
+                <a:ea typeface="ＭＳ Ｐゴシック" charset="0"/>
+              </a:defRPr>
+            </a:lvl6pPr>
+            <a:lvl7pPr marL="2971800" indent="-228600" eaLnBrk="0" fontAlgn="base" hangingPunct="0">
+              <a:spcBef>
+                <a:spcPct val="0"/>
+              </a:spcBef>
+              <a:spcAft>
+                <a:spcPct val="0"/>
+              </a:spcAft>
+              <a:defRPr sz="2400">
+                <a:solidFill>
+                  <a:schemeClr val="tx1"/>
+                </a:solidFill>
+                <a:latin typeface="Trebuchet MS" charset="0"/>
+                <a:ea typeface="ＭＳ Ｐゴシック" charset="0"/>
+              </a:defRPr>
+            </a:lvl7pPr>
+            <a:lvl8pPr marL="3429000" indent="-228600" eaLnBrk="0" fontAlgn="base" hangingPunct="0">
+              <a:spcBef>
+                <a:spcPct val="0"/>
+              </a:spcBef>
+              <a:spcAft>
+                <a:spcPct val="0"/>
+              </a:spcAft>
+              <a:defRPr sz="2400">
+                <a:solidFill>
+                  <a:schemeClr val="tx1"/>
+                </a:solidFill>
+                <a:latin typeface="Trebuchet MS" charset="0"/>
+                <a:ea typeface="ＭＳ Ｐゴシック" charset="0"/>
+              </a:defRPr>
+            </a:lvl8pPr>
+            <a:lvl9pPr marL="3886200" indent="-228600" eaLnBrk="0" fontAlgn="base" hangingPunct="0">
+              <a:spcBef>
+                <a:spcPct val="0"/>
+              </a:spcBef>
+              <a:spcAft>
+                <a:spcPct val="0"/>
+              </a:spcAft>
+              <a:defRPr sz="2400">
+                <a:solidFill>
+                  <a:schemeClr val="tx1"/>
+                </a:solidFill>
+                <a:latin typeface="Trebuchet MS" charset="0"/>
+                <a:ea typeface="ＭＳ Ｐゴシック" charset="0"/>
+              </a:defRPr>
+            </a:lvl9pPr>
+          </a:lstStyle>
+          <a:p>
+            <a:pPr algn="l" eaLnBrk="1" hangingPunct="1"/>
+            <a:r>
+              <a:rPr lang="en-US" sz="1200" b="1" dirty="0" smtClean="0">
+                <a:solidFill>
+                  <a:srgbClr val="122956"/>
+                </a:solidFill>
+                <a:cs typeface="Trebuchet MS" charset="0"/>
+              </a:rPr>
+              <a:t>ATMD-</a:t>
+            </a:r>
+            <a:fld id="{31B56995-E14C-B64F-86C9-12D6DB74A41E}" type="slidenum">
+              <a:rPr lang="en-US" sz="1200" b="1">
+                <a:solidFill>
+                  <a:srgbClr val="122956"/>
+                </a:solidFill>
+                <a:cs typeface="Trebuchet MS" charset="0"/>
+              </a:rPr>
+              <a:pPr algn="l" eaLnBrk="1" hangingPunct="1"/>
+              <a:t>1</a:t>
+            </a:fld>
+            <a:endParaRPr lang="en-US" sz="1200" b="1" dirty="0">
+              <a:solidFill>
+                <a:srgbClr val="122956"/>
+              </a:solidFill>
+              <a:cs typeface="Trebuchet MS" charset="0"/>
+            </a:endParaRPr>
+          </a:p>
+        </p:txBody>
+      </p:sp>
     </p:spTree>
   </p:cSld>
   <p:clrMapOvr>
@@ -10167,6 +10347,186 @@
           </a:p>
         </p:txBody>
       </p:sp>
+      <p:sp>
+        <p:nvSpPr>
+          <p:cNvPr id="5" name="Slide Number Placeholder 5"/>
+          <p:cNvSpPr>
+            <a:spLocks noGrp="1"/>
+          </p:cNvSpPr>
+          <p:nvPr>
+            <p:ph type="sldNum" sz="quarter" idx="12"/>
+          </p:nvPr>
+        </p:nvSpPr>
+        <p:spPr bwMode="auto">
+          <a:xfrm>
+            <a:off x="203200" y="6400800"/>
+            <a:ext cx="2133600" cy="365125"/>
+          </a:xfrm>
+          <a:noFill/>
+          <a:extLst>
+            <a:ext uri="{909E8E84-426E-40dd-AFC4-6F175D3DCCD1}">
+              <a14:hiddenFill xmlns:a14="http://schemas.microsoft.com/office/drawing/2010/main">
+                <a:solidFill>
+                  <a:srgbClr val="FFFFFF"/>
+                </a:solidFill>
+              </a14:hiddenFill>
+            </a:ext>
+            <a:ext uri="{91240B29-F687-4f45-9708-019B960494DF}">
+              <a14:hiddenLine xmlns:a14="http://schemas.microsoft.com/office/drawing/2010/main" w="9525">
+                <a:solidFill>
+                  <a:srgbClr val="000000"/>
+                </a:solidFill>
+                <a:miter lim="800000"/>
+                <a:headEnd/>
+                <a:tailEnd/>
+              </a14:hiddenLine>
+            </a:ext>
+          </a:extLst>
+        </p:spPr>
+        <p:txBody>
+          <a:bodyPr vert="horz" wrap="square" lIns="91440" tIns="45720" rIns="91440" bIns="45720" numCol="1" anchor="ctr" anchorCtr="0" compatLnSpc="1">
+            <a:prstTxWarp prst="textNoShape">
+              <a:avLst/>
+            </a:prstTxWarp>
+          </a:bodyPr>
+          <a:lstStyle>
+            <a:lvl1pPr eaLnBrk="0" hangingPunct="0">
+              <a:defRPr sz="2400">
+                <a:solidFill>
+                  <a:schemeClr val="tx1"/>
+                </a:solidFill>
+                <a:latin typeface="Trebuchet MS" charset="0"/>
+                <a:ea typeface="ＭＳ Ｐゴシック" charset="0"/>
+                <a:cs typeface="ＭＳ Ｐゴシック" charset="0"/>
+              </a:defRPr>
+            </a:lvl1pPr>
+            <a:lvl2pPr marL="742950" indent="-285750" eaLnBrk="0" hangingPunct="0">
+              <a:defRPr sz="2400">
+                <a:solidFill>
+                  <a:schemeClr val="tx1"/>
+                </a:solidFill>
+                <a:latin typeface="Trebuchet MS" charset="0"/>
+                <a:ea typeface="ＭＳ Ｐゴシック" charset="0"/>
+              </a:defRPr>
+            </a:lvl2pPr>
+            <a:lvl3pPr marL="1143000" indent="-228600" eaLnBrk="0" hangingPunct="0">
+              <a:defRPr sz="2400">
+                <a:solidFill>
+                  <a:schemeClr val="tx1"/>
+                </a:solidFill>
+                <a:latin typeface="Trebuchet MS" charset="0"/>
+                <a:ea typeface="ＭＳ Ｐゴシック" charset="0"/>
+              </a:defRPr>
+            </a:lvl3pPr>
+            <a:lvl4pPr marL="1600200" indent="-228600" eaLnBrk="0" hangingPunct="0">
+              <a:defRPr sz="2400">
+                <a:solidFill>
+                  <a:schemeClr val="tx1"/>
+                </a:solidFill>
+                <a:latin typeface="Trebuchet MS" charset="0"/>
+                <a:ea typeface="ＭＳ Ｐゴシック" charset="0"/>
+              </a:defRPr>
+            </a:lvl4pPr>
+            <a:lvl5pPr marL="2057400" indent="-228600" eaLnBrk="0" hangingPunct="0">
+              <a:defRPr sz="2400">
+                <a:solidFill>
+                  <a:schemeClr val="tx1"/>
+                </a:solidFill>
+                <a:latin typeface="Trebuchet MS" charset="0"/>
+                <a:ea typeface="ＭＳ Ｐゴシック" charset="0"/>
+              </a:defRPr>
+            </a:lvl5pPr>
+            <a:lvl6pPr marL="2514600" indent="-228600" eaLnBrk="0" fontAlgn="base" hangingPunct="0">
+              <a:spcBef>
+                <a:spcPct val="0"/>
+              </a:spcBef>
+              <a:spcAft>
+                <a:spcPct val="0"/>
+              </a:spcAft>
+              <a:defRPr sz="2400">
+                <a:solidFill>
+                  <a:schemeClr val="tx1"/>
+                </a:solidFill>
+                <a:latin typeface="Trebuchet MS" charset="0"/>
+                <a:ea typeface="ＭＳ Ｐゴシック" charset="0"/>
+              </a:defRPr>
+            </a:lvl6pPr>
+            <a:lvl7pPr marL="2971800" indent="-228600" eaLnBrk="0" fontAlgn="base" hangingPunct="0">
+              <a:spcBef>
+                <a:spcPct val="0"/>
+              </a:spcBef>
+              <a:spcAft>
+                <a:spcPct val="0"/>
+              </a:spcAft>
+              <a:defRPr sz="2400">
+                <a:solidFill>
+                  <a:schemeClr val="tx1"/>
+                </a:solidFill>
+                <a:latin typeface="Trebuchet MS" charset="0"/>
+                <a:ea typeface="ＭＳ Ｐゴシック" charset="0"/>
+              </a:defRPr>
+            </a:lvl7pPr>
+            <a:lvl8pPr marL="3429000" indent="-228600" eaLnBrk="0" fontAlgn="base" hangingPunct="0">
+              <a:spcBef>
+                <a:spcPct val="0"/>
+              </a:spcBef>
+              <a:spcAft>
+                <a:spcPct val="0"/>
+              </a:spcAft>
+              <a:defRPr sz="2400">
+                <a:solidFill>
+                  <a:schemeClr val="tx1"/>
+                </a:solidFill>
+                <a:latin typeface="Trebuchet MS" charset="0"/>
+                <a:ea typeface="ＭＳ Ｐゴシック" charset="0"/>
+              </a:defRPr>
+            </a:lvl8pPr>
+            <a:lvl9pPr marL="3886200" indent="-228600" eaLnBrk="0" fontAlgn="base" hangingPunct="0">
+              <a:spcBef>
+                <a:spcPct val="0"/>
+              </a:spcBef>
+              <a:spcAft>
+                <a:spcPct val="0"/>
+              </a:spcAft>
+              <a:defRPr sz="2400">
+                <a:solidFill>
+                  <a:schemeClr val="tx1"/>
+                </a:solidFill>
+                <a:latin typeface="Trebuchet MS" charset="0"/>
+                <a:ea typeface="ＭＳ Ｐゴシック" charset="0"/>
+              </a:defRPr>
+            </a:lvl9pPr>
+          </a:lstStyle>
+          <a:p>
+            <a:pPr algn="l" eaLnBrk="1" hangingPunct="1"/>
+            <a:r>
+              <a:rPr lang="en-US" sz="1200" b="1" dirty="0" smtClean="0">
+                <a:solidFill>
+                  <a:srgbClr val="122956"/>
+                </a:solidFill>
+                <a:cs typeface="Trebuchet MS" charset="0"/>
+              </a:rPr>
+              <a:t>ATMD-</a:t>
+            </a:r>
+            <a:fld id="{31B56995-E14C-B64F-86C9-12D6DB74A41E}" type="slidenum">
+              <a:rPr lang="en-US" sz="1200" b="1">
+                <a:solidFill>
+                  <a:srgbClr val="122956"/>
+                </a:solidFill>
+                <a:cs typeface="Trebuchet MS" charset="0"/>
+              </a:rPr>
+              <a:pPr algn="l" eaLnBrk="1" hangingPunct="1"/>
+              <a:t>2</a:t>
+            </a:fld>
+            <a:endParaRPr lang="en-US" sz="1200" b="1" dirty="0">
+              <a:solidFill>
+                <a:srgbClr val="122956"/>
+              </a:solidFill>
+              <a:cs typeface="Trebuchet MS" charset="0"/>
+            </a:endParaRPr>
+          </a:p>
+        </p:txBody>
+      </p:sp>
     </p:spTree>
     <p:extLst>
       <p:ext uri="{BB962C8B-B14F-4D97-AF65-F5344CB8AC3E}">
@@ -10303,6 +10663,186 @@
           </a:p>
         </p:txBody>
       </p:sp>
+      <p:sp>
+        <p:nvSpPr>
+          <p:cNvPr id="4" name="Slide Number Placeholder 5"/>
+          <p:cNvSpPr>
+            <a:spLocks noGrp="1"/>
+          </p:cNvSpPr>
+          <p:nvPr>
+            <p:ph type="sldNum" sz="quarter" idx="12"/>
+          </p:nvPr>
+        </p:nvSpPr>
+        <p:spPr bwMode="auto">
+          <a:xfrm>
+            <a:off x="203200" y="6400800"/>
+            <a:ext cx="2133600" cy="365125"/>
+          </a:xfrm>
+          <a:noFill/>
+          <a:extLst>
+            <a:ext uri="{909E8E84-426E-40dd-AFC4-6F175D3DCCD1}">
+              <a14:hiddenFill xmlns:a14="http://schemas.microsoft.com/office/drawing/2010/main">
+                <a:solidFill>
+                  <a:srgbClr val="FFFFFF"/>
+                </a:solidFill>
+              </a14:hiddenFill>
+            </a:ext>
+            <a:ext uri="{91240B29-F687-4f45-9708-019B960494DF}">
+              <a14:hiddenLine xmlns:a14="http://schemas.microsoft.com/office/drawing/2010/main" w="9525">
+                <a:solidFill>
+                  <a:srgbClr val="000000"/>
+                </a:solidFill>
+                <a:miter lim="800000"/>
+                <a:headEnd/>
+                <a:tailEnd/>
+              </a14:hiddenLine>
+            </a:ext>
+          </a:extLst>
+        </p:spPr>
+        <p:txBody>
+          <a:bodyPr vert="horz" wrap="square" lIns="91440" tIns="45720" rIns="91440" bIns="45720" numCol="1" anchor="ctr" anchorCtr="0" compatLnSpc="1">
+            <a:prstTxWarp prst="textNoShape">
+              <a:avLst/>
+            </a:prstTxWarp>
+          </a:bodyPr>
+          <a:lstStyle>
+            <a:lvl1pPr eaLnBrk="0" hangingPunct="0">
+              <a:defRPr sz="2400">
+                <a:solidFill>
+                  <a:schemeClr val="tx1"/>
+                </a:solidFill>
+                <a:latin typeface="Trebuchet MS" charset="0"/>
+                <a:ea typeface="ＭＳ Ｐゴシック" charset="0"/>
+                <a:cs typeface="ＭＳ Ｐゴシック" charset="0"/>
+              </a:defRPr>
+            </a:lvl1pPr>
+            <a:lvl2pPr marL="742950" indent="-285750" eaLnBrk="0" hangingPunct="0">
+              <a:defRPr sz="2400">
+                <a:solidFill>
+                  <a:schemeClr val="tx1"/>
+                </a:solidFill>
+                <a:latin typeface="Trebuchet MS" charset="0"/>
+                <a:ea typeface="ＭＳ Ｐゴシック" charset="0"/>
+              </a:defRPr>
+            </a:lvl2pPr>
+            <a:lvl3pPr marL="1143000" indent="-228600" eaLnBrk="0" hangingPunct="0">
+              <a:defRPr sz="2400">
+                <a:solidFill>
+                  <a:schemeClr val="tx1"/>
+                </a:solidFill>
+                <a:latin typeface="Trebuchet MS" charset="0"/>
+                <a:ea typeface="ＭＳ Ｐゴシック" charset="0"/>
+              </a:defRPr>
+            </a:lvl3pPr>
+            <a:lvl4pPr marL="1600200" indent="-228600" eaLnBrk="0" hangingPunct="0">
+              <a:defRPr sz="2400">
+                <a:solidFill>
+                  <a:schemeClr val="tx1"/>
+                </a:solidFill>
+                <a:latin typeface="Trebuchet MS" charset="0"/>
+                <a:ea typeface="ＭＳ Ｐゴシック" charset="0"/>
+              </a:defRPr>
+            </a:lvl4pPr>
+            <a:lvl5pPr marL="2057400" indent="-228600" eaLnBrk="0" hangingPunct="0">
+              <a:defRPr sz="2400">
+                <a:solidFill>
+                  <a:schemeClr val="tx1"/>
+                </a:solidFill>
+                <a:latin typeface="Trebuchet MS" charset="0"/>
+                <a:ea typeface="ＭＳ Ｐゴシック" charset="0"/>
+              </a:defRPr>
+            </a:lvl5pPr>
+            <a:lvl6pPr marL="2514600" indent="-228600" eaLnBrk="0" fontAlgn="base" hangingPunct="0">
+              <a:spcBef>
+                <a:spcPct val="0"/>
+              </a:spcBef>
+              <a:spcAft>
+                <a:spcPct val="0"/>
+              </a:spcAft>
+              <a:defRPr sz="2400">
+                <a:solidFill>
+                  <a:schemeClr val="tx1"/>
+                </a:solidFill>
+                <a:latin typeface="Trebuchet MS" charset="0"/>
+                <a:ea typeface="ＭＳ Ｐゴシック" charset="0"/>
+              </a:defRPr>
+            </a:lvl6pPr>
+            <a:lvl7pPr marL="2971800" indent="-228600" eaLnBrk="0" fontAlgn="base" hangingPunct="0">
+              <a:spcBef>
+                <a:spcPct val="0"/>
+              </a:spcBef>
+              <a:spcAft>
+                <a:spcPct val="0"/>
+              </a:spcAft>
+              <a:defRPr sz="2400">
+                <a:solidFill>
+                  <a:schemeClr val="tx1"/>
+                </a:solidFill>
+                <a:latin typeface="Trebuchet MS" charset="0"/>
+                <a:ea typeface="ＭＳ Ｐゴシック" charset="0"/>
+              </a:defRPr>
+            </a:lvl7pPr>
+            <a:lvl8pPr marL="3429000" indent="-228600" eaLnBrk="0" fontAlgn="base" hangingPunct="0">
+              <a:spcBef>
+                <a:spcPct val="0"/>
+              </a:spcBef>
+              <a:spcAft>
+                <a:spcPct val="0"/>
+              </a:spcAft>
+              <a:defRPr sz="2400">
+                <a:solidFill>
+                  <a:schemeClr val="tx1"/>
+                </a:solidFill>
+                <a:latin typeface="Trebuchet MS" charset="0"/>
+                <a:ea typeface="ＭＳ Ｐゴシック" charset="0"/>
+              </a:defRPr>
+            </a:lvl8pPr>
+            <a:lvl9pPr marL="3886200" indent="-228600" eaLnBrk="0" fontAlgn="base" hangingPunct="0">
+              <a:spcBef>
+                <a:spcPct val="0"/>
+              </a:spcBef>
+              <a:spcAft>
+                <a:spcPct val="0"/>
+              </a:spcAft>
+              <a:defRPr sz="2400">
+                <a:solidFill>
+                  <a:schemeClr val="tx1"/>
+                </a:solidFill>
+                <a:latin typeface="Trebuchet MS" charset="0"/>
+                <a:ea typeface="ＭＳ Ｐゴシック" charset="0"/>
+              </a:defRPr>
+            </a:lvl9pPr>
+          </a:lstStyle>
+          <a:p>
+            <a:pPr algn="l" eaLnBrk="1" hangingPunct="1"/>
+            <a:r>
+              <a:rPr lang="en-US" sz="1200" b="1" dirty="0" smtClean="0">
+                <a:solidFill>
+                  <a:srgbClr val="122956"/>
+                </a:solidFill>
+                <a:cs typeface="Trebuchet MS" charset="0"/>
+              </a:rPr>
+              <a:t>ATMD-</a:t>
+            </a:r>
+            <a:fld id="{31B56995-E14C-B64F-86C9-12D6DB74A41E}" type="slidenum">
+              <a:rPr lang="en-US" sz="1200" b="1">
+                <a:solidFill>
+                  <a:srgbClr val="122956"/>
+                </a:solidFill>
+                <a:cs typeface="Trebuchet MS" charset="0"/>
+              </a:rPr>
+              <a:pPr algn="l" eaLnBrk="1" hangingPunct="1"/>
+              <a:t>3</a:t>
+            </a:fld>
+            <a:endParaRPr lang="en-US" sz="1200" b="1" dirty="0">
+              <a:solidFill>
+                <a:srgbClr val="122956"/>
+              </a:solidFill>
+              <a:cs typeface="Trebuchet MS" charset="0"/>
+            </a:endParaRPr>
+          </a:p>
+        </p:txBody>
+      </p:sp>
     </p:spTree>
     <p:extLst>
       <p:ext uri="{BB962C8B-B14F-4D97-AF65-F5344CB8AC3E}">
@@ -10552,6 +11092,186 @@
             <a:pPr marL="0" indent="0" eaLnBrk="1" hangingPunct="1"/>
             <a:endParaRPr lang="en-US" dirty="0" smtClean="0">
               <a:latin typeface="Trebuchet MS" charset="0"/>
+            </a:endParaRPr>
+          </a:p>
+        </p:txBody>
+      </p:sp>
+      <p:sp>
+        <p:nvSpPr>
+          <p:cNvPr id="4" name="Slide Number Placeholder 5"/>
+          <p:cNvSpPr>
+            <a:spLocks noGrp="1"/>
+          </p:cNvSpPr>
+          <p:nvPr>
+            <p:ph type="sldNum" sz="quarter" idx="12"/>
+          </p:nvPr>
+        </p:nvSpPr>
+        <p:spPr bwMode="auto">
+          <a:xfrm>
+            <a:off x="203200" y="6400800"/>
+            <a:ext cx="2133600" cy="365125"/>
+          </a:xfrm>
+          <a:noFill/>
+          <a:extLst>
+            <a:ext uri="{909E8E84-426E-40dd-AFC4-6F175D3DCCD1}">
+              <a14:hiddenFill xmlns:a14="http://schemas.microsoft.com/office/drawing/2010/main">
+                <a:solidFill>
+                  <a:srgbClr val="FFFFFF"/>
+                </a:solidFill>
+              </a14:hiddenFill>
+            </a:ext>
+            <a:ext uri="{91240B29-F687-4f45-9708-019B960494DF}">
+              <a14:hiddenLine xmlns:a14="http://schemas.microsoft.com/office/drawing/2010/main" w="9525">
+                <a:solidFill>
+                  <a:srgbClr val="000000"/>
+                </a:solidFill>
+                <a:miter lim="800000"/>
+                <a:headEnd/>
+                <a:tailEnd/>
+              </a14:hiddenLine>
+            </a:ext>
+          </a:extLst>
+        </p:spPr>
+        <p:txBody>
+          <a:bodyPr vert="horz" wrap="square" lIns="91440" tIns="45720" rIns="91440" bIns="45720" numCol="1" anchor="ctr" anchorCtr="0" compatLnSpc="1">
+            <a:prstTxWarp prst="textNoShape">
+              <a:avLst/>
+            </a:prstTxWarp>
+          </a:bodyPr>
+          <a:lstStyle>
+            <a:lvl1pPr eaLnBrk="0" hangingPunct="0">
+              <a:defRPr sz="2400">
+                <a:solidFill>
+                  <a:schemeClr val="tx1"/>
+                </a:solidFill>
+                <a:latin typeface="Trebuchet MS" charset="0"/>
+                <a:ea typeface="ＭＳ Ｐゴシック" charset="0"/>
+                <a:cs typeface="ＭＳ Ｐゴシック" charset="0"/>
+              </a:defRPr>
+            </a:lvl1pPr>
+            <a:lvl2pPr marL="742950" indent="-285750" eaLnBrk="0" hangingPunct="0">
+              <a:defRPr sz="2400">
+                <a:solidFill>
+                  <a:schemeClr val="tx1"/>
+                </a:solidFill>
+                <a:latin typeface="Trebuchet MS" charset="0"/>
+                <a:ea typeface="ＭＳ Ｐゴシック" charset="0"/>
+              </a:defRPr>
+            </a:lvl2pPr>
+            <a:lvl3pPr marL="1143000" indent="-228600" eaLnBrk="0" hangingPunct="0">
+              <a:defRPr sz="2400">
+                <a:solidFill>
+                  <a:schemeClr val="tx1"/>
+                </a:solidFill>
+                <a:latin typeface="Trebuchet MS" charset="0"/>
+                <a:ea typeface="ＭＳ Ｐゴシック" charset="0"/>
+              </a:defRPr>
+            </a:lvl3pPr>
+            <a:lvl4pPr marL="1600200" indent="-228600" eaLnBrk="0" hangingPunct="0">
+              <a:defRPr sz="2400">
+                <a:solidFill>
+                  <a:schemeClr val="tx1"/>
+                </a:solidFill>
+                <a:latin typeface="Trebuchet MS" charset="0"/>
+                <a:ea typeface="ＭＳ Ｐゴシック" charset="0"/>
+              </a:defRPr>
+            </a:lvl4pPr>
+            <a:lvl5pPr marL="2057400" indent="-228600" eaLnBrk="0" hangingPunct="0">
+              <a:defRPr sz="2400">
+                <a:solidFill>
+                  <a:schemeClr val="tx1"/>
+                </a:solidFill>
+                <a:latin typeface="Trebuchet MS" charset="0"/>
+                <a:ea typeface="ＭＳ Ｐゴシック" charset="0"/>
+              </a:defRPr>
+            </a:lvl5pPr>
+            <a:lvl6pPr marL="2514600" indent="-228600" eaLnBrk="0" fontAlgn="base" hangingPunct="0">
+              <a:spcBef>
+                <a:spcPct val="0"/>
+              </a:spcBef>
+              <a:spcAft>
+                <a:spcPct val="0"/>
+              </a:spcAft>
+              <a:defRPr sz="2400">
+                <a:solidFill>
+                  <a:schemeClr val="tx1"/>
+                </a:solidFill>
+                <a:latin typeface="Trebuchet MS" charset="0"/>
+                <a:ea typeface="ＭＳ Ｐゴシック" charset="0"/>
+              </a:defRPr>
+            </a:lvl6pPr>
+            <a:lvl7pPr marL="2971800" indent="-228600" eaLnBrk="0" fontAlgn="base" hangingPunct="0">
+              <a:spcBef>
+                <a:spcPct val="0"/>
+              </a:spcBef>
+              <a:spcAft>
+                <a:spcPct val="0"/>
+              </a:spcAft>
+              <a:defRPr sz="2400">
+                <a:solidFill>
+                  <a:schemeClr val="tx1"/>
+                </a:solidFill>
+                <a:latin typeface="Trebuchet MS" charset="0"/>
+                <a:ea typeface="ＭＳ Ｐゴシック" charset="0"/>
+              </a:defRPr>
+            </a:lvl7pPr>
+            <a:lvl8pPr marL="3429000" indent="-228600" eaLnBrk="0" fontAlgn="base" hangingPunct="0">
+              <a:spcBef>
+                <a:spcPct val="0"/>
+              </a:spcBef>
+              <a:spcAft>
+                <a:spcPct val="0"/>
+              </a:spcAft>
+              <a:defRPr sz="2400">
+                <a:solidFill>
+                  <a:schemeClr val="tx1"/>
+                </a:solidFill>
+                <a:latin typeface="Trebuchet MS" charset="0"/>
+                <a:ea typeface="ＭＳ Ｐゴシック" charset="0"/>
+              </a:defRPr>
+            </a:lvl8pPr>
+            <a:lvl9pPr marL="3886200" indent="-228600" eaLnBrk="0" fontAlgn="base" hangingPunct="0">
+              <a:spcBef>
+                <a:spcPct val="0"/>
+              </a:spcBef>
+              <a:spcAft>
+                <a:spcPct val="0"/>
+              </a:spcAft>
+              <a:defRPr sz="2400">
+                <a:solidFill>
+                  <a:schemeClr val="tx1"/>
+                </a:solidFill>
+                <a:latin typeface="Trebuchet MS" charset="0"/>
+                <a:ea typeface="ＭＳ Ｐゴシック" charset="0"/>
+              </a:defRPr>
+            </a:lvl9pPr>
+          </a:lstStyle>
+          <a:p>
+            <a:pPr algn="l" eaLnBrk="1" hangingPunct="1"/>
+            <a:r>
+              <a:rPr lang="en-US" sz="1200" b="1" dirty="0" smtClean="0">
+                <a:solidFill>
+                  <a:srgbClr val="122956"/>
+                </a:solidFill>
+                <a:cs typeface="Trebuchet MS" charset="0"/>
+              </a:rPr>
+              <a:t>ATMD-</a:t>
+            </a:r>
+            <a:fld id="{31B56995-E14C-B64F-86C9-12D6DB74A41E}" type="slidenum">
+              <a:rPr lang="en-US" sz="1200" b="1">
+                <a:solidFill>
+                  <a:srgbClr val="122956"/>
+                </a:solidFill>
+                <a:cs typeface="Trebuchet MS" charset="0"/>
+              </a:rPr>
+              <a:pPr algn="l" eaLnBrk="1" hangingPunct="1"/>
+              <a:t>4</a:t>
+            </a:fld>
+            <a:endParaRPr lang="en-US" sz="1200" b="1" dirty="0">
+              <a:solidFill>
+                <a:srgbClr val="122956"/>
+              </a:solidFill>
+              <a:cs typeface="Trebuchet MS" charset="0"/>
             </a:endParaRPr>
           </a:p>
         </p:txBody>
@@ -10689,6 +11409,186 @@
           </a:ln>
         </p:spPr>
       </p:pic>
+      <p:sp>
+        <p:nvSpPr>
+          <p:cNvPr id="5" name="Slide Number Placeholder 5"/>
+          <p:cNvSpPr>
+            <a:spLocks noGrp="1"/>
+          </p:cNvSpPr>
+          <p:nvPr>
+            <p:ph type="sldNum" sz="quarter" idx="12"/>
+          </p:nvPr>
+        </p:nvSpPr>
+        <p:spPr bwMode="auto">
+          <a:xfrm>
+            <a:off x="203200" y="6400800"/>
+            <a:ext cx="2133600" cy="365125"/>
+          </a:xfrm>
+          <a:noFill/>
+          <a:extLst>
+            <a:ext uri="{909E8E84-426E-40dd-AFC4-6F175D3DCCD1}">
+              <a14:hiddenFill xmlns:a14="http://schemas.microsoft.com/office/drawing/2010/main">
+                <a:solidFill>
+                  <a:srgbClr val="FFFFFF"/>
+                </a:solidFill>
+              </a14:hiddenFill>
+            </a:ext>
+            <a:ext uri="{91240B29-F687-4f45-9708-019B960494DF}">
+              <a14:hiddenLine xmlns:a14="http://schemas.microsoft.com/office/drawing/2010/main" w="9525">
+                <a:solidFill>
+                  <a:srgbClr val="000000"/>
+                </a:solidFill>
+                <a:miter lim="800000"/>
+                <a:headEnd/>
+                <a:tailEnd/>
+              </a14:hiddenLine>
+            </a:ext>
+          </a:extLst>
+        </p:spPr>
+        <p:txBody>
+          <a:bodyPr vert="horz" wrap="square" lIns="91440" tIns="45720" rIns="91440" bIns="45720" numCol="1" anchor="ctr" anchorCtr="0" compatLnSpc="1">
+            <a:prstTxWarp prst="textNoShape">
+              <a:avLst/>
+            </a:prstTxWarp>
+          </a:bodyPr>
+          <a:lstStyle>
+            <a:lvl1pPr eaLnBrk="0" hangingPunct="0">
+              <a:defRPr sz="2400">
+                <a:solidFill>
+                  <a:schemeClr val="tx1"/>
+                </a:solidFill>
+                <a:latin typeface="Trebuchet MS" charset="0"/>
+                <a:ea typeface="ＭＳ Ｐゴシック" charset="0"/>
+                <a:cs typeface="ＭＳ Ｐゴシック" charset="0"/>
+              </a:defRPr>
+            </a:lvl1pPr>
+            <a:lvl2pPr marL="742950" indent="-285750" eaLnBrk="0" hangingPunct="0">
+              <a:defRPr sz="2400">
+                <a:solidFill>
+                  <a:schemeClr val="tx1"/>
+                </a:solidFill>
+                <a:latin typeface="Trebuchet MS" charset="0"/>
+                <a:ea typeface="ＭＳ Ｐゴシック" charset="0"/>
+              </a:defRPr>
+            </a:lvl2pPr>
+            <a:lvl3pPr marL="1143000" indent="-228600" eaLnBrk="0" hangingPunct="0">
+              <a:defRPr sz="2400">
+                <a:solidFill>
+                  <a:schemeClr val="tx1"/>
+                </a:solidFill>
+                <a:latin typeface="Trebuchet MS" charset="0"/>
+                <a:ea typeface="ＭＳ Ｐゴシック" charset="0"/>
+              </a:defRPr>
+            </a:lvl3pPr>
+            <a:lvl4pPr marL="1600200" indent="-228600" eaLnBrk="0" hangingPunct="0">
+              <a:defRPr sz="2400">
+                <a:solidFill>
+                  <a:schemeClr val="tx1"/>
+                </a:solidFill>
+                <a:latin typeface="Trebuchet MS" charset="0"/>
+                <a:ea typeface="ＭＳ Ｐゴシック" charset="0"/>
+              </a:defRPr>
+            </a:lvl4pPr>
+            <a:lvl5pPr marL="2057400" indent="-228600" eaLnBrk="0" hangingPunct="0">
+              <a:defRPr sz="2400">
+                <a:solidFill>
+                  <a:schemeClr val="tx1"/>
+                </a:solidFill>
+                <a:latin typeface="Trebuchet MS" charset="0"/>
+                <a:ea typeface="ＭＳ Ｐゴシック" charset="0"/>
+              </a:defRPr>
+            </a:lvl5pPr>
+            <a:lvl6pPr marL="2514600" indent="-228600" eaLnBrk="0" fontAlgn="base" hangingPunct="0">
+              <a:spcBef>
+                <a:spcPct val="0"/>
+              </a:spcBef>
+              <a:spcAft>
+                <a:spcPct val="0"/>
+              </a:spcAft>
+              <a:defRPr sz="2400">
+                <a:solidFill>
+                  <a:schemeClr val="tx1"/>
+                </a:solidFill>
+                <a:latin typeface="Trebuchet MS" charset="0"/>
+                <a:ea typeface="ＭＳ Ｐゴシック" charset="0"/>
+              </a:defRPr>
+            </a:lvl6pPr>
+            <a:lvl7pPr marL="2971800" indent="-228600" eaLnBrk="0" fontAlgn="base" hangingPunct="0">
+              <a:spcBef>
+                <a:spcPct val="0"/>
+              </a:spcBef>
+              <a:spcAft>
+                <a:spcPct val="0"/>
+              </a:spcAft>
+              <a:defRPr sz="2400">
+                <a:solidFill>
+                  <a:schemeClr val="tx1"/>
+                </a:solidFill>
+                <a:latin typeface="Trebuchet MS" charset="0"/>
+                <a:ea typeface="ＭＳ Ｐゴシック" charset="0"/>
+              </a:defRPr>
+            </a:lvl7pPr>
+            <a:lvl8pPr marL="3429000" indent="-228600" eaLnBrk="0" fontAlgn="base" hangingPunct="0">
+              <a:spcBef>
+                <a:spcPct val="0"/>
+              </a:spcBef>
+              <a:spcAft>
+                <a:spcPct val="0"/>
+              </a:spcAft>
+              <a:defRPr sz="2400">
+                <a:solidFill>
+                  <a:schemeClr val="tx1"/>
+                </a:solidFill>
+                <a:latin typeface="Trebuchet MS" charset="0"/>
+                <a:ea typeface="ＭＳ Ｐゴシック" charset="0"/>
+              </a:defRPr>
+            </a:lvl8pPr>
+            <a:lvl9pPr marL="3886200" indent="-228600" eaLnBrk="0" fontAlgn="base" hangingPunct="0">
+              <a:spcBef>
+                <a:spcPct val="0"/>
+              </a:spcBef>
+              <a:spcAft>
+                <a:spcPct val="0"/>
+              </a:spcAft>
+              <a:defRPr sz="2400">
+                <a:solidFill>
+                  <a:schemeClr val="tx1"/>
+                </a:solidFill>
+                <a:latin typeface="Trebuchet MS" charset="0"/>
+                <a:ea typeface="ＭＳ Ｐゴシック" charset="0"/>
+              </a:defRPr>
+            </a:lvl9pPr>
+          </a:lstStyle>
+          <a:p>
+            <a:pPr algn="l" eaLnBrk="1" hangingPunct="1"/>
+            <a:r>
+              <a:rPr lang="en-US" sz="1200" b="1" dirty="0" smtClean="0">
+                <a:solidFill>
+                  <a:srgbClr val="122956"/>
+                </a:solidFill>
+                <a:cs typeface="Trebuchet MS" charset="0"/>
+              </a:rPr>
+              <a:t>ATMD-</a:t>
+            </a:r>
+            <a:fld id="{31B56995-E14C-B64F-86C9-12D6DB74A41E}" type="slidenum">
+              <a:rPr lang="en-US" sz="1200" b="1">
+                <a:solidFill>
+                  <a:srgbClr val="122956"/>
+                </a:solidFill>
+                <a:cs typeface="Trebuchet MS" charset="0"/>
+              </a:rPr>
+              <a:pPr algn="l" eaLnBrk="1" hangingPunct="1"/>
+              <a:t>5</a:t>
+            </a:fld>
+            <a:endParaRPr lang="en-US" sz="1200" b="1" dirty="0">
+              <a:solidFill>
+                <a:srgbClr val="122956"/>
+              </a:solidFill>
+              <a:cs typeface="Trebuchet MS" charset="0"/>
+            </a:endParaRPr>
+          </a:p>
+        </p:txBody>
+      </p:sp>
     </p:spTree>
     <p:extLst>
       <p:ext uri="{BB962C8B-B14F-4D97-AF65-F5344CB8AC3E}">
@@ -10808,6 +11708,186 @@
                 <a:srgbClr val="122956"/>
               </a:solidFill>
               <a:latin typeface="Trebuchet MS" charset="0"/>
+            </a:endParaRPr>
+          </a:p>
+        </p:txBody>
+      </p:sp>
+      <p:sp>
+        <p:nvSpPr>
+          <p:cNvPr id="4" name="Slide Number Placeholder 5"/>
+          <p:cNvSpPr>
+            <a:spLocks noGrp="1"/>
+          </p:cNvSpPr>
+          <p:nvPr>
+            <p:ph type="sldNum" sz="quarter" idx="12"/>
+          </p:nvPr>
+        </p:nvSpPr>
+        <p:spPr bwMode="auto">
+          <a:xfrm>
+            <a:off x="203200" y="6400800"/>
+            <a:ext cx="2133600" cy="365125"/>
+          </a:xfrm>
+          <a:noFill/>
+          <a:extLst>
+            <a:ext uri="{909E8E84-426E-40dd-AFC4-6F175D3DCCD1}">
+              <a14:hiddenFill xmlns:a14="http://schemas.microsoft.com/office/drawing/2010/main">
+                <a:solidFill>
+                  <a:srgbClr val="FFFFFF"/>
+                </a:solidFill>
+              </a14:hiddenFill>
+            </a:ext>
+            <a:ext uri="{91240B29-F687-4f45-9708-019B960494DF}">
+              <a14:hiddenLine xmlns:a14="http://schemas.microsoft.com/office/drawing/2010/main" w="9525">
+                <a:solidFill>
+                  <a:srgbClr val="000000"/>
+                </a:solidFill>
+                <a:miter lim="800000"/>
+                <a:headEnd/>
+                <a:tailEnd/>
+              </a14:hiddenLine>
+            </a:ext>
+          </a:extLst>
+        </p:spPr>
+        <p:txBody>
+          <a:bodyPr vert="horz" wrap="square" lIns="91440" tIns="45720" rIns="91440" bIns="45720" numCol="1" anchor="ctr" anchorCtr="0" compatLnSpc="1">
+            <a:prstTxWarp prst="textNoShape">
+              <a:avLst/>
+            </a:prstTxWarp>
+          </a:bodyPr>
+          <a:lstStyle>
+            <a:lvl1pPr eaLnBrk="0" hangingPunct="0">
+              <a:defRPr sz="2400">
+                <a:solidFill>
+                  <a:schemeClr val="tx1"/>
+                </a:solidFill>
+                <a:latin typeface="Trebuchet MS" charset="0"/>
+                <a:ea typeface="ＭＳ Ｐゴシック" charset="0"/>
+                <a:cs typeface="ＭＳ Ｐゴシック" charset="0"/>
+              </a:defRPr>
+            </a:lvl1pPr>
+            <a:lvl2pPr marL="742950" indent="-285750" eaLnBrk="0" hangingPunct="0">
+              <a:defRPr sz="2400">
+                <a:solidFill>
+                  <a:schemeClr val="tx1"/>
+                </a:solidFill>
+                <a:latin typeface="Trebuchet MS" charset="0"/>
+                <a:ea typeface="ＭＳ Ｐゴシック" charset="0"/>
+              </a:defRPr>
+            </a:lvl2pPr>
+            <a:lvl3pPr marL="1143000" indent="-228600" eaLnBrk="0" hangingPunct="0">
+              <a:defRPr sz="2400">
+                <a:solidFill>
+                  <a:schemeClr val="tx1"/>
+                </a:solidFill>
+                <a:latin typeface="Trebuchet MS" charset="0"/>
+                <a:ea typeface="ＭＳ Ｐゴシック" charset="0"/>
+              </a:defRPr>
+            </a:lvl3pPr>
+            <a:lvl4pPr marL="1600200" indent="-228600" eaLnBrk="0" hangingPunct="0">
+              <a:defRPr sz="2400">
+                <a:solidFill>
+                  <a:schemeClr val="tx1"/>
+                </a:solidFill>
+                <a:latin typeface="Trebuchet MS" charset="0"/>
+                <a:ea typeface="ＭＳ Ｐゴシック" charset="0"/>
+              </a:defRPr>
+            </a:lvl4pPr>
+            <a:lvl5pPr marL="2057400" indent="-228600" eaLnBrk="0" hangingPunct="0">
+              <a:defRPr sz="2400">
+                <a:solidFill>
+                  <a:schemeClr val="tx1"/>
+                </a:solidFill>
+                <a:latin typeface="Trebuchet MS" charset="0"/>
+                <a:ea typeface="ＭＳ Ｐゴシック" charset="0"/>
+              </a:defRPr>
+            </a:lvl5pPr>
+            <a:lvl6pPr marL="2514600" indent="-228600" eaLnBrk="0" fontAlgn="base" hangingPunct="0">
+              <a:spcBef>
+                <a:spcPct val="0"/>
+              </a:spcBef>
+              <a:spcAft>
+                <a:spcPct val="0"/>
+              </a:spcAft>
+              <a:defRPr sz="2400">
+                <a:solidFill>
+                  <a:schemeClr val="tx1"/>
+                </a:solidFill>
+                <a:latin typeface="Trebuchet MS" charset="0"/>
+                <a:ea typeface="ＭＳ Ｐゴシック" charset="0"/>
+              </a:defRPr>
+            </a:lvl6pPr>
+            <a:lvl7pPr marL="2971800" indent="-228600" eaLnBrk="0" fontAlgn="base" hangingPunct="0">
+              <a:spcBef>
+                <a:spcPct val="0"/>
+              </a:spcBef>
+              <a:spcAft>
+                <a:spcPct val="0"/>
+              </a:spcAft>
+              <a:defRPr sz="2400">
+                <a:solidFill>
+                  <a:schemeClr val="tx1"/>
+                </a:solidFill>
+                <a:latin typeface="Trebuchet MS" charset="0"/>
+                <a:ea typeface="ＭＳ Ｐゴシック" charset="0"/>
+              </a:defRPr>
+            </a:lvl7pPr>
+            <a:lvl8pPr marL="3429000" indent="-228600" eaLnBrk="0" fontAlgn="base" hangingPunct="0">
+              <a:spcBef>
+                <a:spcPct val="0"/>
+              </a:spcBef>
+              <a:spcAft>
+                <a:spcPct val="0"/>
+              </a:spcAft>
+              <a:defRPr sz="2400">
+                <a:solidFill>
+                  <a:schemeClr val="tx1"/>
+                </a:solidFill>
+                <a:latin typeface="Trebuchet MS" charset="0"/>
+                <a:ea typeface="ＭＳ Ｐゴシック" charset="0"/>
+              </a:defRPr>
+            </a:lvl8pPr>
+            <a:lvl9pPr marL="3886200" indent="-228600" eaLnBrk="0" fontAlgn="base" hangingPunct="0">
+              <a:spcBef>
+                <a:spcPct val="0"/>
+              </a:spcBef>
+              <a:spcAft>
+                <a:spcPct val="0"/>
+              </a:spcAft>
+              <a:defRPr sz="2400">
+                <a:solidFill>
+                  <a:schemeClr val="tx1"/>
+                </a:solidFill>
+                <a:latin typeface="Trebuchet MS" charset="0"/>
+                <a:ea typeface="ＭＳ Ｐゴシック" charset="0"/>
+              </a:defRPr>
+            </a:lvl9pPr>
+          </a:lstStyle>
+          <a:p>
+            <a:pPr algn="l" eaLnBrk="1" hangingPunct="1"/>
+            <a:r>
+              <a:rPr lang="en-US" sz="1200" b="1" dirty="0" smtClean="0">
+                <a:solidFill>
+                  <a:srgbClr val="122956"/>
+                </a:solidFill>
+                <a:cs typeface="Trebuchet MS" charset="0"/>
+              </a:rPr>
+              <a:t>ATMD-</a:t>
+            </a:r>
+            <a:fld id="{31B56995-E14C-B64F-86C9-12D6DB74A41E}" type="slidenum">
+              <a:rPr lang="en-US" sz="1200" b="1">
+                <a:solidFill>
+                  <a:srgbClr val="122956"/>
+                </a:solidFill>
+                <a:cs typeface="Trebuchet MS" charset="0"/>
+              </a:rPr>
+              <a:pPr algn="l" eaLnBrk="1" hangingPunct="1"/>
+              <a:t>6</a:t>
+            </a:fld>
+            <a:endParaRPr lang="en-US" sz="1200" b="1" dirty="0">
+              <a:solidFill>
+                <a:srgbClr val="122956"/>
+              </a:solidFill>
+              <a:cs typeface="Trebuchet MS" charset="0"/>
             </a:endParaRPr>
           </a:p>
         </p:txBody>

</xml_diff>